<commit_message>
added module for OWASP checks
</commit_message>
<xml_diff>
--- a/doc/intro/slides/lesson_10_security.pptx
+++ b/doc/intro/slides/lesson_10_security.pptx
@@ -5,7 +5,7 @@
     <p:sldMasterId id="2147483648" r:id="rId1"/>
   </p:sldMasterIdLst>
   <p:notesMasterIdLst>
-    <p:notesMasterId r:id="rId30"/>
+    <p:notesMasterId r:id="rId32"/>
   </p:notesMasterIdLst>
   <p:sldIdLst>
     <p:sldId id="256" r:id="rId2"/>
@@ -35,7 +35,9 @@
     <p:sldId id="275" r:id="rId26"/>
     <p:sldId id="298" r:id="rId27"/>
     <p:sldId id="300" r:id="rId28"/>
-    <p:sldId id="271" r:id="rId29"/>
+    <p:sldId id="301" r:id="rId29"/>
+    <p:sldId id="302" r:id="rId30"/>
+    <p:sldId id="271" r:id="rId31"/>
   </p:sldIdLst>
   <p:sldSz cx="12192000" cy="6858000"/>
   <p:notesSz cx="6858000" cy="9144000"/>
@@ -224,7 +226,7 @@
           <a:p>
             <a:fld id="{9B5B52BA-3295-0343-9E28-A260A811DD10}" type="datetimeFigureOut">
               <a:rPr lang="en-US" smtClean="0"/>
-              <a:t>21-Feb-18</a:t>
+              <a:t>2/25/18</a:t>
             </a:fld>
             <a:endParaRPr lang="en-US"/>
           </a:p>
@@ -707,7 +709,7 @@
           <a:p>
             <a:fld id="{04F1D4A2-813C-F741-B481-C92B3A596030}" type="datetimeFigureOut">
               <a:rPr lang="en-US" smtClean="0"/>
-              <a:t>21-Feb-18</a:t>
+              <a:t>2/25/18</a:t>
             </a:fld>
             <a:endParaRPr lang="en-US"/>
           </a:p>
@@ -877,7 +879,7 @@
           <a:p>
             <a:fld id="{04F1D4A2-813C-F741-B481-C92B3A596030}" type="datetimeFigureOut">
               <a:rPr lang="en-US" smtClean="0"/>
-              <a:t>21-Feb-18</a:t>
+              <a:t>2/25/18</a:t>
             </a:fld>
             <a:endParaRPr lang="en-US"/>
           </a:p>
@@ -1057,7 +1059,7 @@
           <a:p>
             <a:fld id="{04F1D4A2-813C-F741-B481-C92B3A596030}" type="datetimeFigureOut">
               <a:rPr lang="en-US" smtClean="0"/>
-              <a:t>21-Feb-18</a:t>
+              <a:t>2/25/18</a:t>
             </a:fld>
             <a:endParaRPr lang="en-US"/>
           </a:p>
@@ -1238,7 +1240,7 @@
           <a:p>
             <a:fld id="{04F1D4A2-813C-F741-B481-C92B3A596030}" type="datetimeFigureOut">
               <a:rPr lang="en-US" smtClean="0"/>
-              <a:t>21-Feb-18</a:t>
+              <a:t>2/25/18</a:t>
             </a:fld>
             <a:endParaRPr lang="en-US"/>
           </a:p>
@@ -1484,7 +1486,7 @@
           <a:p>
             <a:fld id="{04F1D4A2-813C-F741-B481-C92B3A596030}" type="datetimeFigureOut">
               <a:rPr lang="en-US" smtClean="0"/>
-              <a:t>21-Feb-18</a:t>
+              <a:t>2/25/18</a:t>
             </a:fld>
             <a:endParaRPr lang="en-US"/>
           </a:p>
@@ -1716,7 +1718,7 @@
           <a:p>
             <a:fld id="{04F1D4A2-813C-F741-B481-C92B3A596030}" type="datetimeFigureOut">
               <a:rPr lang="en-US" smtClean="0"/>
-              <a:t>21-Feb-18</a:t>
+              <a:t>2/25/18</a:t>
             </a:fld>
             <a:endParaRPr lang="en-US"/>
           </a:p>
@@ -2083,7 +2085,7 @@
           <a:p>
             <a:fld id="{04F1D4A2-813C-F741-B481-C92B3A596030}" type="datetimeFigureOut">
               <a:rPr lang="en-US" smtClean="0"/>
-              <a:t>21-Feb-18</a:t>
+              <a:t>2/25/18</a:t>
             </a:fld>
             <a:endParaRPr lang="en-US"/>
           </a:p>
@@ -2201,7 +2203,7 @@
           <a:p>
             <a:fld id="{04F1D4A2-813C-F741-B481-C92B3A596030}" type="datetimeFigureOut">
               <a:rPr lang="en-US" smtClean="0"/>
-              <a:t>21-Feb-18</a:t>
+              <a:t>2/25/18</a:t>
             </a:fld>
             <a:endParaRPr lang="en-US"/>
           </a:p>
@@ -2296,7 +2298,7 @@
           <a:p>
             <a:fld id="{04F1D4A2-813C-F741-B481-C92B3A596030}" type="datetimeFigureOut">
               <a:rPr lang="en-US" smtClean="0"/>
-              <a:t>21-Feb-18</a:t>
+              <a:t>2/25/18</a:t>
             </a:fld>
             <a:endParaRPr lang="en-US"/>
           </a:p>
@@ -2573,7 +2575,7 @@
           <a:p>
             <a:fld id="{04F1D4A2-813C-F741-B481-C92B3A596030}" type="datetimeFigureOut">
               <a:rPr lang="en-US" smtClean="0"/>
-              <a:t>21-Feb-18</a:t>
+              <a:t>2/25/18</a:t>
             </a:fld>
             <a:endParaRPr lang="en-US"/>
           </a:p>
@@ -2826,7 +2828,7 @@
           <a:p>
             <a:fld id="{04F1D4A2-813C-F741-B481-C92B3A596030}" type="datetimeFigureOut">
               <a:rPr lang="en-US" smtClean="0"/>
-              <a:t>21-Feb-18</a:t>
+              <a:t>2/25/18</a:t>
             </a:fld>
             <a:endParaRPr lang="en-US"/>
           </a:p>
@@ -3039,7 +3041,7 @@
           <a:p>
             <a:fld id="{04F1D4A2-813C-F741-B481-C92B3A596030}" type="datetimeFigureOut">
               <a:rPr lang="en-US" smtClean="0"/>
-              <a:t>21-Feb-18</a:t>
+              <a:t>2/25/18</a:t>
             </a:fld>
             <a:endParaRPr lang="en-US"/>
           </a:p>
@@ -3484,15 +3486,7 @@
             </a:br>
             <a:r>
               <a:rPr lang="en-US" dirty="0" smtClean="0"/>
-              <a:t>Lesson </a:t>
-            </a:r>
-            <a:r>
-              <a:rPr lang="en-US" dirty="0" smtClean="0"/>
-              <a:t>10</a:t>
-            </a:r>
-            <a:r>
-              <a:rPr lang="en-US" dirty="0" smtClean="0"/>
-              <a:t>: Security</a:t>
+              <a:t>Lesson 10: Security</a:t>
             </a:r>
             <a:endParaRPr lang="en-US" dirty="0"/>
           </a:p>
@@ -3774,11 +3768,7 @@
             </a:r>
             <a:r>
               <a:rPr lang="en-US" dirty="0" smtClean="0"/>
-              <a:t> </a:t>
-            </a:r>
-            <a:r>
-              <a:rPr lang="en-US" dirty="0" smtClean="0"/>
-              <a:t>cookies used to define “sessions”</a:t>
+              <a:t> cookies used to define “sessions”</a:t>
             </a:r>
           </a:p>
           <a:p>
@@ -4726,13 +4716,8 @@
           <a:p>
             <a:r>
               <a:rPr lang="en-US" dirty="0" smtClean="0"/>
-              <a:t>When creating new user, need to save password somewhere, usually a </a:t>
-            </a:r>
-            <a:r>
-              <a:rPr lang="en-US" dirty="0" smtClean="0"/>
-              <a:t>database</a:t>
-            </a:r>
-            <a:endParaRPr lang="en-US" dirty="0" smtClean="0"/>
+              <a:t>When creating new user, need to save password somewhere, usually a database</a:t>
+            </a:r>
           </a:p>
           <a:p>
             <a:r>
@@ -5078,11 +5063,7 @@
             </a:r>
             <a:r>
               <a:rPr lang="en-US" i="1" dirty="0" smtClean="0"/>
-              <a:t>y = h(z</a:t>
-            </a:r>
-            <a:r>
-              <a:rPr lang="en-US" i="1" dirty="0" smtClean="0"/>
-              <a:t>)</a:t>
+              <a:t>y = h(z)</a:t>
             </a:r>
             <a:endParaRPr lang="en-US" i="1" dirty="0"/>
           </a:p>
@@ -5303,15 +5284,7 @@
           <a:p>
             <a:r>
               <a:rPr lang="en-US" dirty="0" smtClean="0"/>
-              <a:t>How can server verify the login of user A with password X, if the server does not know </a:t>
-            </a:r>
-            <a:r>
-              <a:rPr lang="en-US" dirty="0" smtClean="0"/>
-              <a:t>the password X</a:t>
-            </a:r>
-            <a:r>
-              <a:rPr lang="en-US" dirty="0" smtClean="0"/>
-              <a:t>, but only the hash Y=h(X)?</a:t>
+              <a:t>How can server verify the login of user A with password X, if the server does not know the password X, but only the hash Y=h(X)?</a:t>
             </a:r>
           </a:p>
           <a:p>
@@ -5978,23 +5951,7 @@
           <a:p>
             <a:r>
               <a:rPr lang="en-US" dirty="0" smtClean="0"/>
-              <a:t>These </a:t>
-            </a:r>
-            <a:r>
-              <a:rPr lang="en-US" dirty="0" smtClean="0"/>
-              <a:t>few slides on Spring Security are </a:t>
-            </a:r>
-            <a:r>
-              <a:rPr lang="en-US" dirty="0" smtClean="0"/>
-              <a:t>just high level overviews of </a:t>
-            </a:r>
-            <a:r>
-              <a:rPr lang="en-US" dirty="0" smtClean="0"/>
-              <a:t>what covered </a:t>
-            </a:r>
-            <a:r>
-              <a:rPr lang="en-US" dirty="0" smtClean="0"/>
-              <a:t>in class</a:t>
+              <a:t>These few slides on Spring Security are just high level overviews of what covered in class</a:t>
             </a:r>
           </a:p>
           <a:p>
@@ -6394,12 +6351,8 @@
           <a:lstStyle/>
           <a:p>
             <a:r>
-              <a:rPr lang="en-US" dirty="0" err="1" smtClean="0"/>
-              <a:t>Git</a:t>
-            </a:r>
-            <a:r>
-              <a:rPr lang="en-US" dirty="0" smtClean="0"/>
-              <a:t> Repository Modules</a:t>
+              <a:rPr lang="en-US" dirty="0" smtClean="0"/>
+              <a:t>OWASP</a:t>
             </a:r>
             <a:endParaRPr lang="en-US" dirty="0"/>
           </a:p>
@@ -6407,73 +6360,173 @@
       </p:sp>
       <p:sp>
         <p:nvSpPr>
-          <p:cNvPr id="5" name="Content Placeholder 4"/>
-          <p:cNvSpPr>
-            <a:spLocks noGrp="1"/>
-          </p:cNvSpPr>
-          <p:nvPr>
-            <p:ph idx="1"/>
-          </p:nvPr>
-        </p:nvSpPr>
-        <p:spPr>
-          <a:xfrm>
-            <a:off x="838200" y="1825625"/>
-            <a:ext cx="10515600" cy="4972740"/>
-          </a:xfrm>
-        </p:spPr>
-        <p:txBody>
-          <a:bodyPr>
-            <a:normAutofit/>
-          </a:bodyPr>
-          <a:lstStyle/>
-          <a:p>
-            <a:r>
-              <a:rPr lang="en-US" i="1" dirty="0" smtClean="0"/>
-              <a:t>NOTE: most of the explanations will be directly in the code as comments, and not here in the slides</a:t>
-            </a:r>
-          </a:p>
-          <a:p>
-            <a:r>
-              <a:rPr lang="en-US" b="1" dirty="0" smtClean="0"/>
-              <a:t>intro/spring/security/manual</a:t>
-            </a:r>
-          </a:p>
-          <a:p>
-            <a:r>
-              <a:rPr lang="en-US" b="1" dirty="0" smtClean="0"/>
-              <a:t>intro/spring/security/authorization</a:t>
-            </a:r>
-            <a:endParaRPr lang="en-US" b="1" dirty="0" smtClean="0"/>
-          </a:p>
-          <a:p>
-            <a:r>
-              <a:rPr lang="en-US" dirty="0" smtClean="0"/>
-              <a:t>Exercises </a:t>
-            </a:r>
-            <a:r>
-              <a:rPr lang="en-US" dirty="0" smtClean="0"/>
-              <a:t>for Lesson </a:t>
-            </a:r>
-            <a:r>
-              <a:rPr lang="en-US" dirty="0" smtClean="0"/>
-              <a:t>10</a:t>
-            </a:r>
-            <a:r>
-              <a:rPr lang="en-US" dirty="0" smtClean="0"/>
-              <a:t> </a:t>
-            </a:r>
-            <a:r>
-              <a:rPr lang="en-US" dirty="0" smtClean="0"/>
-              <a:t>(see documentation)</a:t>
-            </a:r>
-            <a:endParaRPr lang="en-US" dirty="0"/>
+          <p:cNvPr id="5" name="Text Placeholder 4"/>
+          <p:cNvSpPr>
+            <a:spLocks noGrp="1"/>
+          </p:cNvSpPr>
+          <p:nvPr>
+            <p:ph type="body" idx="1"/>
+          </p:nvPr>
+        </p:nvSpPr>
+        <p:spPr/>
+        <p:txBody>
+          <a:bodyPr/>
+          <a:lstStyle/>
+          <a:p>
+            <a:endParaRPr lang="en-US"/>
           </a:p>
         </p:txBody>
       </p:sp>
     </p:spTree>
     <p:extLst>
       <p:ext uri="{BB962C8B-B14F-4D97-AF65-F5344CB8AC3E}">
-        <p14:creationId xmlns:p14="http://schemas.microsoft.com/office/powerpoint/2010/main" val="1023732187"/>
+        <p14:creationId xmlns:p14="http://schemas.microsoft.com/office/powerpoint/2010/main" val="151532738"/>
+      </p:ext>
+    </p:extLst>
+  </p:cSld>
+  <p:clrMapOvr>
+    <a:masterClrMapping/>
+  </p:clrMapOvr>
+</p:sld>
+</file>
+
+<file path=ppt/slides/slide29.xml><?xml version="1.0" encoding="utf-8"?>
+<p:sld xmlns:a="http://schemas.openxmlformats.org/drawingml/2006/main" xmlns:r="http://schemas.openxmlformats.org/officeDocument/2006/relationships" xmlns:p="http://schemas.openxmlformats.org/presentationml/2006/main">
+  <p:cSld>
+    <p:spTree>
+      <p:nvGrpSpPr>
+        <p:cNvPr id="1" name=""/>
+        <p:cNvGrpSpPr/>
+        <p:nvPr/>
+      </p:nvGrpSpPr>
+      <p:grpSpPr>
+        <a:xfrm>
+          <a:off x="0" y="0"/>
+          <a:ext cx="0" cy="0"/>
+          <a:chOff x="0" y="0"/>
+          <a:chExt cx="0" cy="0"/>
+        </a:xfrm>
+      </p:grpSpPr>
+      <p:sp>
+        <p:nvSpPr>
+          <p:cNvPr id="2" name="Title 1"/>
+          <p:cNvSpPr>
+            <a:spLocks noGrp="1"/>
+          </p:cNvSpPr>
+          <p:nvPr>
+            <p:ph type="title"/>
+          </p:nvPr>
+        </p:nvSpPr>
+        <p:spPr>
+          <a:xfrm>
+            <a:off x="182880" y="365125"/>
+            <a:ext cx="11762072" cy="1325563"/>
+          </a:xfrm>
+        </p:spPr>
+        <p:txBody>
+          <a:bodyPr>
+            <a:normAutofit fontScale="90000"/>
+          </a:bodyPr>
+          <a:lstStyle/>
+          <a:p>
+            <a:r>
+              <a:rPr lang="en-US"/>
+              <a:t>Open Web Application Security Project (OWASP) </a:t>
+            </a:r>
+            <a:endParaRPr lang="en-US" dirty="0"/>
+          </a:p>
+        </p:txBody>
+      </p:sp>
+      <p:sp>
+        <p:nvSpPr>
+          <p:cNvPr id="3" name="Content Placeholder 2"/>
+          <p:cNvSpPr>
+            <a:spLocks noGrp="1"/>
+          </p:cNvSpPr>
+          <p:nvPr>
+            <p:ph idx="1"/>
+          </p:nvPr>
+        </p:nvSpPr>
+        <p:spPr>
+          <a:xfrm>
+            <a:off x="182880" y="1970003"/>
+            <a:ext cx="11762072" cy="4777305"/>
+          </a:xfrm>
+        </p:spPr>
+        <p:txBody>
+          <a:bodyPr/>
+          <a:lstStyle/>
+          <a:p>
+            <a:r>
+              <a:rPr lang="en-US" dirty="0" smtClean="0">
+                <a:hlinkClick r:id="rId2"/>
+              </a:rPr>
+              <a:t>www.owasp.org</a:t>
+            </a:r>
+            <a:endParaRPr lang="en-US" dirty="0" smtClean="0"/>
+          </a:p>
+          <a:p>
+            <a:r>
+              <a:rPr lang="en-US" dirty="0" smtClean="0"/>
+              <a:t>A non-profit organization dedicated to software security</a:t>
+            </a:r>
+          </a:p>
+          <a:p>
+            <a:r>
+              <a:rPr lang="en-US" dirty="0" smtClean="0"/>
+              <a:t>One of the main resources to learn about software security</a:t>
+            </a:r>
+          </a:p>
+          <a:p>
+            <a:r>
+              <a:rPr lang="en-US" dirty="0" smtClean="0"/>
+              <a:t>Also produces some open-source tools (</a:t>
+            </a:r>
+            <a:r>
+              <a:rPr lang="en-US" dirty="0" err="1" smtClean="0"/>
+              <a:t>eg</a:t>
+            </a:r>
+            <a:r>
+              <a:rPr lang="en-US" dirty="0" smtClean="0"/>
+              <a:t> ZAP </a:t>
+            </a:r>
+            <a:r>
+              <a:rPr lang="en-US" smtClean="0"/>
+              <a:t>for penetration testing)</a:t>
+            </a:r>
+            <a:endParaRPr lang="en-US" dirty="0" smtClean="0"/>
+          </a:p>
+          <a:p>
+            <a:r>
+              <a:rPr lang="en-US" dirty="0" smtClean="0"/>
+              <a:t>Maven plugin </a:t>
+            </a:r>
+            <a:r>
+              <a:rPr lang="en-US" i="1" dirty="0" smtClean="0"/>
+              <a:t>dependency-check-maven</a:t>
+            </a:r>
+          </a:p>
+          <a:p>
+            <a:pPr lvl="1"/>
+            <a:r>
+              <a:rPr lang="en-US" dirty="0" smtClean="0"/>
+              <a:t>Scan your third-party dependency libraries for known vulnerability</a:t>
+            </a:r>
+          </a:p>
+          <a:p>
+            <a:pPr lvl="1"/>
+            <a:r>
+              <a:rPr lang="en-US" dirty="0" smtClean="0"/>
+              <a:t>Automatically connect to an updated database</a:t>
+            </a:r>
+            <a:endParaRPr lang="en-US" dirty="0"/>
+          </a:p>
+        </p:txBody>
+      </p:sp>
+    </p:spTree>
+    <p:extLst>
+      <p:ext uri="{BB962C8B-B14F-4D97-AF65-F5344CB8AC3E}">
+        <p14:creationId xmlns:p14="http://schemas.microsoft.com/office/powerpoint/2010/main" val="2042605871"/>
       </p:ext>
     </p:extLst>
   </p:cSld>
@@ -6637,6 +6690,118 @@
     <p:extLst>
       <p:ext uri="{BB962C8B-B14F-4D97-AF65-F5344CB8AC3E}">
         <p14:creationId xmlns:p14="http://schemas.microsoft.com/office/powerpoint/2010/main" val="3489912102"/>
+      </p:ext>
+    </p:extLst>
+  </p:cSld>
+  <p:clrMapOvr>
+    <a:masterClrMapping/>
+  </p:clrMapOvr>
+</p:sld>
+</file>
+
+<file path=ppt/slides/slide30.xml><?xml version="1.0" encoding="utf-8"?>
+<p:sld xmlns:a="http://schemas.openxmlformats.org/drawingml/2006/main" xmlns:r="http://schemas.openxmlformats.org/officeDocument/2006/relationships" xmlns:p="http://schemas.openxmlformats.org/presentationml/2006/main">
+  <p:cSld>
+    <p:spTree>
+      <p:nvGrpSpPr>
+        <p:cNvPr id="1" name=""/>
+        <p:cNvGrpSpPr/>
+        <p:nvPr/>
+      </p:nvGrpSpPr>
+      <p:grpSpPr>
+        <a:xfrm>
+          <a:off x="0" y="0"/>
+          <a:ext cx="0" cy="0"/>
+          <a:chOff x="0" y="0"/>
+          <a:chExt cx="0" cy="0"/>
+        </a:xfrm>
+      </p:grpSpPr>
+      <p:sp>
+        <p:nvSpPr>
+          <p:cNvPr id="4" name="Title 3"/>
+          <p:cNvSpPr>
+            <a:spLocks noGrp="1"/>
+          </p:cNvSpPr>
+          <p:nvPr>
+            <p:ph type="title"/>
+          </p:nvPr>
+        </p:nvSpPr>
+        <p:spPr/>
+        <p:txBody>
+          <a:bodyPr/>
+          <a:lstStyle/>
+          <a:p>
+            <a:r>
+              <a:rPr lang="en-US" dirty="0" err="1" smtClean="0"/>
+              <a:t>Git</a:t>
+            </a:r>
+            <a:r>
+              <a:rPr lang="en-US" dirty="0" smtClean="0"/>
+              <a:t> Repository Modules</a:t>
+            </a:r>
+            <a:endParaRPr lang="en-US" dirty="0"/>
+          </a:p>
+        </p:txBody>
+      </p:sp>
+      <p:sp>
+        <p:nvSpPr>
+          <p:cNvPr id="5" name="Content Placeholder 4"/>
+          <p:cNvSpPr>
+            <a:spLocks noGrp="1"/>
+          </p:cNvSpPr>
+          <p:nvPr>
+            <p:ph idx="1"/>
+          </p:nvPr>
+        </p:nvSpPr>
+        <p:spPr>
+          <a:xfrm>
+            <a:off x="838200" y="1825625"/>
+            <a:ext cx="10515600" cy="4972740"/>
+          </a:xfrm>
+        </p:spPr>
+        <p:txBody>
+          <a:bodyPr>
+            <a:normAutofit/>
+          </a:bodyPr>
+          <a:lstStyle/>
+          <a:p>
+            <a:r>
+              <a:rPr lang="en-US" i="1" dirty="0" smtClean="0"/>
+              <a:t>NOTE: most of the explanations will be directly in the code as comments, and not here in the slides</a:t>
+            </a:r>
+          </a:p>
+          <a:p>
+            <a:r>
+              <a:rPr lang="en-US" b="1" dirty="0" smtClean="0"/>
+              <a:t>intro/spring/security/manual</a:t>
+            </a:r>
+          </a:p>
+          <a:p>
+            <a:r>
+              <a:rPr lang="en-US" b="1" dirty="0" smtClean="0"/>
+              <a:t>intro/spring/security/authorization</a:t>
+            </a:r>
+          </a:p>
+          <a:p>
+            <a:r>
+              <a:rPr lang="en-US" b="1" dirty="0"/>
+              <a:t>intro/spring/security/dependencies</a:t>
+            </a:r>
+            <a:endParaRPr lang="en-US" b="1" dirty="0" smtClean="0"/>
+          </a:p>
+          <a:p>
+            <a:r>
+              <a:rPr lang="en-US" dirty="0" smtClean="0"/>
+              <a:t>Exercises for Lesson 10 (see documentation)</a:t>
+            </a:r>
+            <a:endParaRPr lang="en-US" dirty="0"/>
+          </a:p>
+        </p:txBody>
+      </p:sp>
+    </p:spTree>
+    <p:extLst>
+      <p:ext uri="{BB962C8B-B14F-4D97-AF65-F5344CB8AC3E}">
+        <p14:creationId xmlns:p14="http://schemas.microsoft.com/office/powerpoint/2010/main" val="1023732187"/>
       </p:ext>
     </p:extLst>
   </p:cSld>
@@ -7134,13 +7299,8 @@
           <a:p>
             <a:r>
               <a:rPr lang="en-US" dirty="0" smtClean="0"/>
-              <a:t>When talking about security and what to implement on the server, think about HTTP/S messages, not necessarily coming from </a:t>
-            </a:r>
-            <a:r>
-              <a:rPr lang="en-US" dirty="0" smtClean="0"/>
-              <a:t>browsers</a:t>
-            </a:r>
-            <a:endParaRPr lang="en-US" dirty="0" smtClean="0"/>
+              <a:t>When talking about security and what to implement on the server, think about HTTP/S messages, not necessarily coming from browsers</a:t>
+            </a:r>
           </a:p>
           <a:p>
             <a:r>

</xml_diff>

<commit_message>
update for les09 and les10
</commit_message>
<xml_diff>
--- a/doc/intro/slides/lesson_10_security.pptx
+++ b/doc/intro/slides/lesson_10_security.pptx
@@ -5,7 +5,7 @@
     <p:sldMasterId id="2147483648" r:id="rId1"/>
   </p:sldMasterIdLst>
   <p:notesMasterIdLst>
-    <p:notesMasterId r:id="rId32"/>
+    <p:notesMasterId r:id="rId33"/>
   </p:notesMasterIdLst>
   <p:sldIdLst>
     <p:sldId id="256" r:id="rId2"/>
@@ -26,18 +26,19 @@
     <p:sldId id="290" r:id="rId17"/>
     <p:sldId id="291" r:id="rId18"/>
     <p:sldId id="292" r:id="rId19"/>
-    <p:sldId id="293" r:id="rId20"/>
-    <p:sldId id="294" r:id="rId21"/>
-    <p:sldId id="295" r:id="rId22"/>
-    <p:sldId id="296" r:id="rId23"/>
-    <p:sldId id="299" r:id="rId24"/>
-    <p:sldId id="297" r:id="rId25"/>
-    <p:sldId id="275" r:id="rId26"/>
-    <p:sldId id="298" r:id="rId27"/>
-    <p:sldId id="300" r:id="rId28"/>
-    <p:sldId id="301" r:id="rId29"/>
-    <p:sldId id="302" r:id="rId30"/>
-    <p:sldId id="271" r:id="rId31"/>
+    <p:sldId id="303" r:id="rId20"/>
+    <p:sldId id="293" r:id="rId21"/>
+    <p:sldId id="294" r:id="rId22"/>
+    <p:sldId id="295" r:id="rId23"/>
+    <p:sldId id="296" r:id="rId24"/>
+    <p:sldId id="299" r:id="rId25"/>
+    <p:sldId id="297" r:id="rId26"/>
+    <p:sldId id="275" r:id="rId27"/>
+    <p:sldId id="298" r:id="rId28"/>
+    <p:sldId id="300" r:id="rId29"/>
+    <p:sldId id="301" r:id="rId30"/>
+    <p:sldId id="302" r:id="rId31"/>
+    <p:sldId id="271" r:id="rId32"/>
   </p:sldIdLst>
   <p:sldSz cx="12192000" cy="6858000"/>
   <p:notesSz cx="6858000" cy="9144000"/>
@@ -226,7 +227,7 @@
           <a:p>
             <a:fld id="{9B5B52BA-3295-0343-9E28-A260A811DD10}" type="datetimeFigureOut">
               <a:rPr lang="en-US" smtClean="0"/>
-              <a:t>25-Feb-19</a:t>
+              <a:t>20-Dec-19</a:t>
             </a:fld>
             <a:endParaRPr lang="en-US"/>
           </a:p>
@@ -643,7 +644,7 @@
           <a:p>
             <a:fld id="{D6FB5A5B-CC88-B64A-8F56-0DBE0ACA83DE}" type="slidenum">
               <a:rPr lang="en-US" smtClean="0"/>
-              <a:t>24</a:t>
+              <a:t>25</a:t>
             </a:fld>
             <a:endParaRPr lang="en-US"/>
           </a:p>
@@ -793,7 +794,7 @@
           <a:p>
             <a:fld id="{04F1D4A2-813C-F741-B481-C92B3A596030}" type="datetimeFigureOut">
               <a:rPr lang="en-US" smtClean="0"/>
-              <a:t>25-Feb-19</a:t>
+              <a:t>20-Dec-19</a:t>
             </a:fld>
             <a:endParaRPr lang="en-US"/>
           </a:p>
@@ -963,7 +964,7 @@
           <a:p>
             <a:fld id="{04F1D4A2-813C-F741-B481-C92B3A596030}" type="datetimeFigureOut">
               <a:rPr lang="en-US" smtClean="0"/>
-              <a:t>25-Feb-19</a:t>
+              <a:t>20-Dec-19</a:t>
             </a:fld>
             <a:endParaRPr lang="en-US"/>
           </a:p>
@@ -1143,7 +1144,7 @@
           <a:p>
             <a:fld id="{04F1D4A2-813C-F741-B481-C92B3A596030}" type="datetimeFigureOut">
               <a:rPr lang="en-US" smtClean="0"/>
-              <a:t>25-Feb-19</a:t>
+              <a:t>20-Dec-19</a:t>
             </a:fld>
             <a:endParaRPr lang="en-US"/>
           </a:p>
@@ -1324,7 +1325,7 @@
           <a:p>
             <a:fld id="{04F1D4A2-813C-F741-B481-C92B3A596030}" type="datetimeFigureOut">
               <a:rPr lang="en-US" smtClean="0"/>
-              <a:t>25-Feb-19</a:t>
+              <a:t>20-Dec-19</a:t>
             </a:fld>
             <a:endParaRPr lang="en-US"/>
           </a:p>
@@ -1570,7 +1571,7 @@
           <a:p>
             <a:fld id="{04F1D4A2-813C-F741-B481-C92B3A596030}" type="datetimeFigureOut">
               <a:rPr lang="en-US" smtClean="0"/>
-              <a:t>25-Feb-19</a:t>
+              <a:t>20-Dec-19</a:t>
             </a:fld>
             <a:endParaRPr lang="en-US"/>
           </a:p>
@@ -1802,7 +1803,7 @@
           <a:p>
             <a:fld id="{04F1D4A2-813C-F741-B481-C92B3A596030}" type="datetimeFigureOut">
               <a:rPr lang="en-US" smtClean="0"/>
-              <a:t>25-Feb-19</a:t>
+              <a:t>20-Dec-19</a:t>
             </a:fld>
             <a:endParaRPr lang="en-US"/>
           </a:p>
@@ -2169,7 +2170,7 @@
           <a:p>
             <a:fld id="{04F1D4A2-813C-F741-B481-C92B3A596030}" type="datetimeFigureOut">
               <a:rPr lang="en-US" smtClean="0"/>
-              <a:t>25-Feb-19</a:t>
+              <a:t>20-Dec-19</a:t>
             </a:fld>
             <a:endParaRPr lang="en-US"/>
           </a:p>
@@ -2287,7 +2288,7 @@
           <a:p>
             <a:fld id="{04F1D4A2-813C-F741-B481-C92B3A596030}" type="datetimeFigureOut">
               <a:rPr lang="en-US" smtClean="0"/>
-              <a:t>25-Feb-19</a:t>
+              <a:t>20-Dec-19</a:t>
             </a:fld>
             <a:endParaRPr lang="en-US"/>
           </a:p>
@@ -2382,7 +2383,7 @@
           <a:p>
             <a:fld id="{04F1D4A2-813C-F741-B481-C92B3A596030}" type="datetimeFigureOut">
               <a:rPr lang="en-US" smtClean="0"/>
-              <a:t>25-Feb-19</a:t>
+              <a:t>20-Dec-19</a:t>
             </a:fld>
             <a:endParaRPr lang="en-US"/>
           </a:p>
@@ -2659,7 +2660,7 @@
           <a:p>
             <a:fld id="{04F1D4A2-813C-F741-B481-C92B3A596030}" type="datetimeFigureOut">
               <a:rPr lang="en-US" smtClean="0"/>
-              <a:t>25-Feb-19</a:t>
+              <a:t>20-Dec-19</a:t>
             </a:fld>
             <a:endParaRPr lang="en-US"/>
           </a:p>
@@ -2912,7 +2913,7 @@
           <a:p>
             <a:fld id="{04F1D4A2-813C-F741-B481-C92B3A596030}" type="datetimeFigureOut">
               <a:rPr lang="en-US" smtClean="0"/>
-              <a:t>25-Feb-19</a:t>
+              <a:t>20-Dec-19</a:t>
             </a:fld>
             <a:endParaRPr lang="en-US"/>
           </a:p>
@@ -3125,7 +3126,7 @@
           <a:p>
             <a:fld id="{04F1D4A2-813C-F741-B481-C92B3A596030}" type="datetimeFigureOut">
               <a:rPr lang="en-US" smtClean="0"/>
-              <a:t>25-Feb-19</a:t>
+              <a:t>20-Dec-19</a:t>
             </a:fld>
             <a:endParaRPr lang="en-US"/>
           </a:p>
@@ -4936,247 +4937,54 @@
             <p:ph type="title"/>
           </p:nvPr>
         </p:nvSpPr>
-        <p:spPr/>
-        <p:txBody>
-          <a:bodyPr/>
-          <a:lstStyle/>
-          <a:p>
-            <a:r>
-              <a:rPr lang="en-US" dirty="0" smtClean="0"/>
-              <a:t>Hash Functions</a:t>
-            </a:r>
-            <a:endParaRPr lang="en-US" dirty="0"/>
-          </a:p>
-        </p:txBody>
-      </p:sp>
-      <p:sp>
-        <p:nvSpPr>
-          <p:cNvPr id="3" name="Content Placeholder 2"/>
-          <p:cNvSpPr>
-            <a:spLocks noGrp="1"/>
-          </p:cNvSpPr>
-          <p:nvPr>
-            <p:ph idx="1"/>
-          </p:nvPr>
-        </p:nvSpPr>
         <p:spPr>
           <a:xfrm>
-            <a:off x="251460" y="1825624"/>
-            <a:ext cx="11772900" cy="4758055"/>
+            <a:off x="146088" y="137877"/>
+            <a:ext cx="11903432" cy="673720"/>
           </a:xfrm>
         </p:spPr>
         <p:txBody>
           <a:bodyPr>
-            <a:normAutofit fontScale="92500" lnSpcReduction="10000"/>
+            <a:normAutofit fontScale="90000"/>
           </a:bodyPr>
           <a:lstStyle/>
           <a:p>
             <a:r>
-              <a:rPr lang="en-US" i="1" dirty="0" smtClean="0"/>
-              <a:t>h(x) = y</a:t>
-            </a:r>
-          </a:p>
-          <a:p>
-            <a:r>
-              <a:rPr lang="en-US" dirty="0" smtClean="0"/>
-              <a:t>It is just a mathematical function from </a:t>
-            </a:r>
-            <a:r>
-              <a:rPr lang="en-US" i="1" dirty="0" smtClean="0"/>
-              <a:t>x</a:t>
-            </a:r>
-            <a:r>
-              <a:rPr lang="en-US" dirty="0" smtClean="0"/>
-              <a:t> to </a:t>
-            </a:r>
-            <a:r>
-              <a:rPr lang="en-US" i="1" dirty="0" smtClean="0"/>
-              <a:t>y</a:t>
-            </a:r>
-          </a:p>
-          <a:p>
-            <a:pPr lvl="1"/>
-            <a:r>
-              <a:rPr lang="en-US" dirty="0" smtClean="0"/>
-              <a:t>In our case, </a:t>
-            </a:r>
-            <a:r>
-              <a:rPr lang="en-US" i="1" dirty="0" smtClean="0"/>
-              <a:t>x </a:t>
-            </a:r>
-            <a:r>
-              <a:rPr lang="en-US" dirty="0" smtClean="0"/>
-              <a:t>is the password, and </a:t>
-            </a:r>
-            <a:r>
-              <a:rPr lang="en-US" i="1" dirty="0" smtClean="0"/>
-              <a:t>y</a:t>
-            </a:r>
-            <a:r>
-              <a:rPr lang="en-US" dirty="0" smtClean="0"/>
-              <a:t> is its hashed value</a:t>
-            </a:r>
-          </a:p>
-          <a:p>
-            <a:r>
-              <a:rPr lang="en-US" dirty="0" smtClean="0"/>
-              <a:t>Deterministic: always same </a:t>
-            </a:r>
-            <a:r>
-              <a:rPr lang="en-US" i="1" dirty="0" smtClean="0"/>
-              <a:t>y</a:t>
-            </a:r>
-            <a:r>
-              <a:rPr lang="en-US" dirty="0" smtClean="0"/>
-              <a:t> from same input </a:t>
-            </a:r>
-            <a:r>
-              <a:rPr lang="en-US" i="1" dirty="0" smtClean="0"/>
-              <a:t>x</a:t>
-            </a:r>
-            <a:endParaRPr lang="en-US" dirty="0" smtClean="0"/>
-          </a:p>
-          <a:p>
-            <a:r>
-              <a:rPr lang="en-US" dirty="0" smtClean="0"/>
-              <a:t>Shouldn’t be able to recover </a:t>
-            </a:r>
-            <a:r>
-              <a:rPr lang="en-US" i="1" dirty="0" smtClean="0"/>
-              <a:t>x </a:t>
-            </a:r>
-            <a:r>
-              <a:rPr lang="en-US" dirty="0" smtClean="0"/>
-              <a:t>from </a:t>
-            </a:r>
-            <a:r>
-              <a:rPr lang="en-US" i="1" dirty="0" smtClean="0"/>
-              <a:t>y, </a:t>
-            </a:r>
-            <a:r>
-              <a:rPr lang="en-US" dirty="0" smtClean="0"/>
-              <a:t>even if you have full knowledge of how </a:t>
-            </a:r>
-            <a:r>
-              <a:rPr lang="en-US" i="1" dirty="0" smtClean="0"/>
-              <a:t>h()</a:t>
-            </a:r>
-            <a:r>
-              <a:rPr lang="en-US" dirty="0" smtClean="0"/>
-              <a:t> is implemented</a:t>
+              <a:rPr lang="en-US" dirty="0" smtClean="0"/>
+              <a:t>Plain-text Passwords? GDPR fines…</a:t>
             </a:r>
             <a:endParaRPr lang="en-US" dirty="0"/>
           </a:p>
-          <a:p>
-            <a:r>
-              <a:rPr lang="en-US" dirty="0" smtClean="0"/>
-              <a:t>Small change </a:t>
-            </a:r>
-            <a:r>
-              <a:rPr lang="en-US" i="1" dirty="0" smtClean="0"/>
-              <a:t>x’ </a:t>
-            </a:r>
-            <a:r>
-              <a:rPr lang="en-US" dirty="0" smtClean="0"/>
-              <a:t>to </a:t>
-            </a:r>
-            <a:r>
-              <a:rPr lang="en-US" i="1" dirty="0" smtClean="0"/>
-              <a:t>x </a:t>
-            </a:r>
-            <a:r>
-              <a:rPr lang="en-US" dirty="0" smtClean="0"/>
-              <a:t>should lead to big different between </a:t>
-            </a:r>
-            <a:r>
-              <a:rPr lang="en-US" i="1" dirty="0" smtClean="0"/>
-              <a:t>y </a:t>
-            </a:r>
-            <a:r>
-              <a:rPr lang="en-US" dirty="0" smtClean="0"/>
-              <a:t>and </a:t>
-            </a:r>
-            <a:r>
-              <a:rPr lang="en-US" i="1" dirty="0" smtClean="0"/>
-              <a:t>y’</a:t>
-            </a:r>
-          </a:p>
-          <a:p>
-            <a:pPr lvl="1"/>
-            <a:r>
-              <a:rPr lang="en-US" dirty="0" err="1"/>
-              <a:t>i</a:t>
-            </a:r>
-            <a:r>
-              <a:rPr lang="en-US" dirty="0" err="1" smtClean="0"/>
-              <a:t>e</a:t>
-            </a:r>
-            <a:r>
-              <a:rPr lang="en-US" dirty="0" smtClean="0"/>
-              <a:t>, </a:t>
-            </a:r>
-            <a:r>
-              <a:rPr lang="en-US" i="1" dirty="0" smtClean="0"/>
-              <a:t>y </a:t>
-            </a:r>
-            <a:r>
-              <a:rPr lang="en-US" dirty="0" smtClean="0"/>
-              <a:t>and </a:t>
-            </a:r>
-            <a:r>
-              <a:rPr lang="en-US" i="1" dirty="0" smtClean="0"/>
-              <a:t>y’ </a:t>
-            </a:r>
-            <a:r>
-              <a:rPr lang="en-US" dirty="0" smtClean="0"/>
-              <a:t>should look uncorrelated, and so cannot say if </a:t>
-            </a:r>
-            <a:r>
-              <a:rPr lang="en-US" i="1" dirty="0" smtClean="0"/>
-              <a:t>x </a:t>
-            </a:r>
-            <a:r>
-              <a:rPr lang="en-US" dirty="0" smtClean="0"/>
-              <a:t>and </a:t>
-            </a:r>
-            <a:r>
-              <a:rPr lang="en-US" i="1" dirty="0" smtClean="0"/>
-              <a:t>x’</a:t>
-            </a:r>
-            <a:r>
-              <a:rPr lang="en-US" dirty="0" smtClean="0"/>
-              <a:t> are similar </a:t>
-            </a:r>
-          </a:p>
-          <a:p>
-            <a:r>
-              <a:rPr lang="en-US" dirty="0" smtClean="0"/>
-              <a:t>No collision: no two values should have same hash, </a:t>
-            </a:r>
-            <a:r>
-              <a:rPr lang="en-US" dirty="0" err="1" smtClean="0"/>
-              <a:t>ie</a:t>
-            </a:r>
-            <a:r>
-              <a:rPr lang="en-US" dirty="0" smtClean="0"/>
-              <a:t> </a:t>
-            </a:r>
-            <a:r>
-              <a:rPr lang="en-US" i="1" dirty="0"/>
-              <a:t>h(x) = </a:t>
-            </a:r>
-            <a:r>
-              <a:rPr lang="en-US" i="1" dirty="0" smtClean="0"/>
-              <a:t>y = h(z)</a:t>
-            </a:r>
-            <a:endParaRPr lang="en-US" i="1" dirty="0"/>
-          </a:p>
-        </p:txBody>
-      </p:sp>
+        </p:txBody>
+      </p:sp>
+      <p:pic>
+        <p:nvPicPr>
+          <p:cNvPr id="4" name="Picture 3"/>
+          <p:cNvPicPr>
+            <a:picLocks noChangeAspect="1"/>
+          </p:cNvPicPr>
+          <p:nvPr/>
+        </p:nvPicPr>
+        <p:blipFill>
+          <a:blip r:embed="rId2"/>
+          <a:stretch>
+            <a:fillRect/>
+          </a:stretch>
+        </p:blipFill>
+        <p:spPr>
+          <a:xfrm>
+            <a:off x="2663775" y="992221"/>
+            <a:ext cx="6759826" cy="6928728"/>
+          </a:xfrm>
+          <a:prstGeom prst="rect">
+            <a:avLst/>
+          </a:prstGeom>
+        </p:spPr>
+      </p:pic>
     </p:spTree>
     <p:extLst>
       <p:ext uri="{BB962C8B-B14F-4D97-AF65-F5344CB8AC3E}">
-        <p14:creationId xmlns:p14="http://schemas.microsoft.com/office/powerpoint/2010/main" val="1438618307"/>
+        <p14:creationId xmlns:p14="http://schemas.microsoft.com/office/powerpoint/2010/main" val="594928808"/>
       </p:ext>
     </p:extLst>
   </p:cSld>
@@ -5360,7 +5168,7 @@
           <a:p>
             <a:r>
               <a:rPr lang="en-US" dirty="0" smtClean="0"/>
-              <a:t>Login with Hashed Passwords</a:t>
+              <a:t>Hash Functions</a:t>
             </a:r>
             <a:endParaRPr lang="en-US" dirty="0"/>
           </a:p>
@@ -5378,103 +5186,197 @@
         </p:nvSpPr>
         <p:spPr>
           <a:xfrm>
-            <a:off x="269507" y="1825624"/>
-            <a:ext cx="11694695" cy="4777307"/>
+            <a:off x="251460" y="1825624"/>
+            <a:ext cx="11772900" cy="4758055"/>
           </a:xfrm>
         </p:spPr>
         <p:txBody>
-          <a:bodyPr/>
-          <a:lstStyle/>
-          <a:p>
-            <a:r>
-              <a:rPr lang="en-US" dirty="0" smtClean="0"/>
-              <a:t>How can server verify the login of user </a:t>
-            </a:r>
+          <a:bodyPr>
+            <a:normAutofit fontScale="92500" lnSpcReduction="10000"/>
+          </a:bodyPr>
+          <a:lstStyle/>
+          <a:p>
             <a:r>
               <a:rPr lang="en-US" i="1" dirty="0" smtClean="0"/>
-              <a:t>A</a:t>
-            </a:r>
-            <a:r>
-              <a:rPr lang="en-US" dirty="0" smtClean="0"/>
-              <a:t> with password </a:t>
+              <a:t>h(x) = y</a:t>
+            </a:r>
+          </a:p>
+          <a:p>
+            <a:r>
+              <a:rPr lang="en-US" dirty="0" smtClean="0"/>
+              <a:t>It is just a mathematical function from </a:t>
             </a:r>
             <a:r>
               <a:rPr lang="en-US" i="1" dirty="0" smtClean="0"/>
-              <a:t>X</a:t>
-            </a:r>
-            <a:r>
-              <a:rPr lang="en-US" dirty="0" smtClean="0"/>
-              <a:t>, if the server does not know the password </a:t>
+              <a:t>x</a:t>
+            </a:r>
+            <a:r>
+              <a:rPr lang="en-US" dirty="0" smtClean="0"/>
+              <a:t> to </a:t>
             </a:r>
             <a:r>
               <a:rPr lang="en-US" i="1" dirty="0" smtClean="0"/>
-              <a:t>X</a:t>
-            </a:r>
-            <a:r>
-              <a:rPr lang="en-US" dirty="0" smtClean="0"/>
-              <a:t>, but only the hash </a:t>
+              <a:t>y</a:t>
+            </a:r>
+          </a:p>
+          <a:p>
+            <a:pPr lvl="1"/>
+            <a:r>
+              <a:rPr lang="en-US" dirty="0" smtClean="0"/>
+              <a:t>In our case, </a:t>
             </a:r>
             <a:r>
               <a:rPr lang="en-US" i="1" dirty="0" smtClean="0"/>
-              <a:t>Y=h(X)</a:t>
-            </a:r>
-            <a:r>
-              <a:rPr lang="en-US" dirty="0" smtClean="0"/>
-              <a:t>?</a:t>
-            </a:r>
-          </a:p>
-          <a:p>
-            <a:r>
-              <a:rPr lang="en-US" dirty="0" smtClean="0"/>
-              <a:t>Server needs to retrieve from database the hash </a:t>
+              <a:t>x </a:t>
+            </a:r>
+            <a:r>
+              <a:rPr lang="en-US" dirty="0" smtClean="0"/>
+              <a:t>is the password, and </a:t>
             </a:r>
             <a:r>
               <a:rPr lang="en-US" i="1" dirty="0" smtClean="0"/>
-              <a:t>Y</a:t>
-            </a:r>
-            <a:r>
-              <a:rPr lang="en-US" dirty="0" smtClean="0"/>
-              <a:t> for given user </a:t>
+              <a:t>y</a:t>
+            </a:r>
+            <a:r>
+              <a:rPr lang="en-US" dirty="0" smtClean="0"/>
+              <a:t> is its hashed value</a:t>
+            </a:r>
+          </a:p>
+          <a:p>
+            <a:r>
+              <a:rPr lang="en-US" dirty="0" smtClean="0"/>
+              <a:t>Deterministic: always same </a:t>
             </a:r>
             <a:r>
               <a:rPr lang="en-US" i="1" dirty="0" smtClean="0"/>
-              <a:t>A</a:t>
+              <a:t>y</a:t>
+            </a:r>
+            <a:r>
+              <a:rPr lang="en-US" dirty="0" smtClean="0"/>
+              <a:t> from same input </a:t>
+            </a:r>
+            <a:r>
+              <a:rPr lang="en-US" i="1" dirty="0" smtClean="0"/>
+              <a:t>x</a:t>
+            </a:r>
+            <a:endParaRPr lang="en-US" dirty="0" smtClean="0"/>
+          </a:p>
+          <a:p>
+            <a:r>
+              <a:rPr lang="en-US" dirty="0" smtClean="0"/>
+              <a:t>Shouldn’t be able to recover </a:t>
+            </a:r>
+            <a:r>
+              <a:rPr lang="en-US" i="1" dirty="0" smtClean="0"/>
+              <a:t>x </a:t>
+            </a:r>
+            <a:r>
+              <a:rPr lang="en-US" dirty="0" smtClean="0"/>
+              <a:t>from </a:t>
+            </a:r>
+            <a:r>
+              <a:rPr lang="en-US" i="1" dirty="0" smtClean="0"/>
+              <a:t>y, </a:t>
+            </a:r>
+            <a:r>
+              <a:rPr lang="en-US" dirty="0" smtClean="0"/>
+              <a:t>even if you have full knowledge of how </a:t>
+            </a:r>
+            <a:r>
+              <a:rPr lang="en-US" i="1" dirty="0" smtClean="0"/>
+              <a:t>h()</a:t>
+            </a:r>
+            <a:r>
+              <a:rPr lang="en-US" dirty="0" smtClean="0"/>
+              <a:t> is implemented</a:t>
+            </a:r>
+            <a:endParaRPr lang="en-US" dirty="0"/>
+          </a:p>
+          <a:p>
+            <a:r>
+              <a:rPr lang="en-US" dirty="0" smtClean="0"/>
+              <a:t>Small change </a:t>
+            </a:r>
+            <a:r>
+              <a:rPr lang="en-US" i="1" dirty="0" smtClean="0"/>
+              <a:t>x’ </a:t>
+            </a:r>
+            <a:r>
+              <a:rPr lang="en-US" dirty="0" smtClean="0"/>
+              <a:t>to </a:t>
+            </a:r>
+            <a:r>
+              <a:rPr lang="en-US" i="1" dirty="0" smtClean="0"/>
+              <a:t>x </a:t>
+            </a:r>
+            <a:r>
+              <a:rPr lang="en-US" dirty="0" smtClean="0"/>
+              <a:t>should lead to big different between </a:t>
+            </a:r>
+            <a:r>
+              <a:rPr lang="en-US" i="1" dirty="0" smtClean="0"/>
+              <a:t>y </a:t>
+            </a:r>
+            <a:r>
+              <a:rPr lang="en-US" dirty="0" smtClean="0"/>
+              <a:t>and </a:t>
+            </a:r>
+            <a:r>
+              <a:rPr lang="en-US" i="1" dirty="0" smtClean="0"/>
+              <a:t>y’</a:t>
+            </a:r>
+          </a:p>
+          <a:p>
+            <a:pPr lvl="1"/>
+            <a:r>
+              <a:rPr lang="en-US" dirty="0" err="1"/>
+              <a:t>i</a:t>
+            </a:r>
+            <a:r>
+              <a:rPr lang="en-US" dirty="0" err="1" smtClean="0"/>
+              <a:t>e</a:t>
             </a:r>
             <a:r>
               <a:rPr lang="en-US" dirty="0" smtClean="0"/>
               <a:t>, </a:t>
             </a:r>
             <a:r>
-              <a:rPr lang="en-US" dirty="0" err="1" smtClean="0"/>
-              <a:t>recompute</a:t>
-            </a:r>
-            <a:r>
-              <a:rPr lang="en-US" dirty="0" smtClean="0"/>
-              <a:t> the hash </a:t>
-            </a:r>
-            <a:r>
               <a:rPr lang="en-US" i="1" dirty="0" smtClean="0"/>
-              <a:t>h(X)</a:t>
-            </a:r>
-            <a:r>
-              <a:rPr lang="en-US" dirty="0" smtClean="0"/>
-              <a:t> from the input password </a:t>
+              <a:t>y </a:t>
+            </a:r>
+            <a:r>
+              <a:rPr lang="en-US" dirty="0" smtClean="0"/>
+              <a:t>and </a:t>
             </a:r>
             <a:r>
               <a:rPr lang="en-US" i="1" dirty="0" smtClean="0"/>
-              <a:t>X</a:t>
-            </a:r>
-            <a:r>
-              <a:rPr lang="en-US" dirty="0" smtClean="0"/>
-              <a:t>, and then verify that the new hash does match </a:t>
+              <a:t>y’ </a:t>
+            </a:r>
+            <a:r>
+              <a:rPr lang="en-US" dirty="0" smtClean="0"/>
+              <a:t>should look uncorrelated, and so cannot say if </a:t>
             </a:r>
             <a:r>
               <a:rPr lang="en-US" i="1" dirty="0" smtClean="0"/>
-              <a:t>Y</a:t>
-            </a:r>
-            <a:r>
-              <a:rPr lang="en-US" dirty="0" smtClean="0"/>
-              <a:t>, </a:t>
+              <a:t>x </a:t>
+            </a:r>
+            <a:r>
+              <a:rPr lang="en-US" dirty="0" smtClean="0"/>
+              <a:t>and </a:t>
+            </a:r>
+            <a:r>
+              <a:rPr lang="en-US" i="1" dirty="0" smtClean="0"/>
+              <a:t>x’</a:t>
+            </a:r>
+            <a:r>
+              <a:rPr lang="en-US" dirty="0" smtClean="0"/>
+              <a:t> are similar </a:t>
+            </a:r>
+          </a:p>
+          <a:p>
+            <a:r>
+              <a:rPr lang="en-US" dirty="0" smtClean="0"/>
+              <a:t>No collision: no two values should have same hash, </a:t>
             </a:r>
             <a:r>
               <a:rPr lang="en-US" dirty="0" err="1" smtClean="0"/>
@@ -5485,19 +5387,21 @@
               <a:t> </a:t>
             </a:r>
             <a:r>
+              <a:rPr lang="en-US" i="1" dirty="0"/>
+              <a:t>h(x) = </a:t>
+            </a:r>
+            <a:r>
               <a:rPr lang="en-US" i="1" dirty="0" smtClean="0"/>
-              <a:t>Y == h(X)</a:t>
-            </a:r>
-          </a:p>
-          <a:p>
-            <a:endParaRPr lang="en-US" dirty="0"/>
+              <a:t>y = h(z)</a:t>
+            </a:r>
+            <a:endParaRPr lang="en-US" i="1" dirty="0"/>
           </a:p>
         </p:txBody>
       </p:sp>
     </p:spTree>
     <p:extLst>
       <p:ext uri="{BB962C8B-B14F-4D97-AF65-F5344CB8AC3E}">
-        <p14:creationId xmlns:p14="http://schemas.microsoft.com/office/powerpoint/2010/main" val="42993303"/>
+        <p14:creationId xmlns:p14="http://schemas.microsoft.com/office/powerpoint/2010/main" val="1438618307"/>
       </p:ext>
     </p:extLst>
   </p:cSld>
@@ -5540,12 +5444,8 @@
           <a:lstStyle/>
           <a:p>
             <a:r>
-              <a:rPr lang="en-US" i="1" dirty="0" smtClean="0"/>
-              <a:t>Salted</a:t>
-            </a:r>
-            <a:r>
-              <a:rPr lang="en-US" dirty="0" smtClean="0"/>
-              <a:t> Passwords</a:t>
+              <a:rPr lang="en-US" dirty="0" smtClean="0"/>
+              <a:t>Login with Hashed Passwords</a:t>
             </a:r>
             <a:endParaRPr lang="en-US" dirty="0"/>
           </a:p>
@@ -5563,25 +5463,55 @@
         </p:nvSpPr>
         <p:spPr>
           <a:xfrm>
-            <a:off x="308008" y="1825624"/>
-            <a:ext cx="11704320" cy="4883184"/>
+            <a:off x="269507" y="1825624"/>
+            <a:ext cx="11694695" cy="4777307"/>
           </a:xfrm>
         </p:spPr>
         <p:txBody>
-          <a:bodyPr>
-            <a:normAutofit fontScale="85000" lnSpcReduction="20000"/>
-          </a:bodyPr>
-          <a:lstStyle/>
-          <a:p>
-            <a:r>
-              <a:rPr lang="en-US" dirty="0" smtClean="0"/>
-              <a:t>Cannot expect users to have long passwords</a:t>
-            </a:r>
-          </a:p>
-          <a:p>
-            <a:r>
-              <a:rPr lang="en-US" dirty="0" smtClean="0"/>
-              <a:t>If hacker has access to DB, from a hash </a:t>
+          <a:bodyPr/>
+          <a:lstStyle/>
+          <a:p>
+            <a:r>
+              <a:rPr lang="en-US" dirty="0" smtClean="0"/>
+              <a:t>How can server verify the login of user </a:t>
+            </a:r>
+            <a:r>
+              <a:rPr lang="en-US" i="1" dirty="0" smtClean="0"/>
+              <a:t>A</a:t>
+            </a:r>
+            <a:r>
+              <a:rPr lang="en-US" dirty="0" smtClean="0"/>
+              <a:t> with password </a:t>
+            </a:r>
+            <a:r>
+              <a:rPr lang="en-US" i="1" dirty="0" smtClean="0"/>
+              <a:t>X</a:t>
+            </a:r>
+            <a:r>
+              <a:rPr lang="en-US" dirty="0" smtClean="0"/>
+              <a:t>, if the server does not know the password </a:t>
+            </a:r>
+            <a:r>
+              <a:rPr lang="en-US" i="1" dirty="0" smtClean="0"/>
+              <a:t>X</a:t>
+            </a:r>
+            <a:r>
+              <a:rPr lang="en-US" dirty="0" smtClean="0"/>
+              <a:t>, but only the hash </a:t>
+            </a:r>
+            <a:r>
+              <a:rPr lang="en-US" i="1" dirty="0" smtClean="0"/>
+              <a:t>Y=h(X)</a:t>
+            </a:r>
+            <a:r>
+              <a:rPr lang="en-US" dirty="0" smtClean="0"/>
+              <a:t>?</a:t>
+            </a:r>
+          </a:p>
+          <a:p>
+            <a:r>
+              <a:rPr lang="en-US" dirty="0" smtClean="0"/>
+              <a:t>Server needs to retrieve from database the hash </a:t>
             </a:r>
             <a:r>
               <a:rPr lang="en-US" i="1" dirty="0" smtClean="0"/>
@@ -5589,45 +5519,47 @@
             </a:r>
             <a:r>
               <a:rPr lang="en-US" dirty="0" smtClean="0"/>
-              <a:t>, can calculate </a:t>
+              <a:t> for given user </a:t>
             </a:r>
             <a:r>
               <a:rPr lang="en-US" i="1" dirty="0" smtClean="0"/>
-              <a:t>h(K)</a:t>
-            </a:r>
-            <a:r>
-              <a:rPr lang="en-US" dirty="0" smtClean="0"/>
-              <a:t> for all strings K up to certain length N, </a:t>
+              <a:t>A</a:t>
+            </a:r>
+            <a:r>
+              <a:rPr lang="en-US" dirty="0" smtClean="0"/>
+              <a:t>, </a:t>
             </a:r>
             <a:r>
               <a:rPr lang="en-US" dirty="0" err="1" smtClean="0"/>
-              <a:t>eg</a:t>
-            </a:r>
-            <a:r>
-              <a:rPr lang="en-US" dirty="0" smtClean="0"/>
-              <a:t> N=8, and check if any </a:t>
+              <a:t>recompute</a:t>
+            </a:r>
+            <a:r>
+              <a:rPr lang="en-US" dirty="0" smtClean="0"/>
+              <a:t> the hash </a:t>
             </a:r>
             <a:r>
               <a:rPr lang="en-US" i="1" dirty="0" smtClean="0"/>
-              <a:t>h(K)</a:t>
-            </a:r>
-            <a:r>
-              <a:rPr lang="en-US" dirty="0" smtClean="0"/>
-              <a:t> does match Y</a:t>
-            </a:r>
-          </a:p>
-          <a:p>
-            <a:r>
-              <a:rPr lang="en-US" dirty="0" smtClean="0"/>
-              <a:t>For small N, this is doable. Do not even need to run </a:t>
+              <a:t>h(X)</a:t>
+            </a:r>
+            <a:r>
+              <a:rPr lang="en-US" dirty="0" smtClean="0"/>
+              <a:t> from the input password </a:t>
             </a:r>
             <a:r>
               <a:rPr lang="en-US" i="1" dirty="0" smtClean="0"/>
-              <a:t>h(), </a:t>
-            </a:r>
-            <a:r>
-              <a:rPr lang="en-US" dirty="0" smtClean="0"/>
-              <a:t>as those values can be pre-computed, </a:t>
+              <a:t>X</a:t>
+            </a:r>
+            <a:r>
+              <a:rPr lang="en-US" dirty="0" smtClean="0"/>
+              <a:t>, and then verify that the new hash does match </a:t>
+            </a:r>
+            <a:r>
+              <a:rPr lang="en-US" i="1" dirty="0" smtClean="0"/>
+              <a:t>Y</a:t>
+            </a:r>
+            <a:r>
+              <a:rPr lang="en-US" dirty="0" smtClean="0"/>
+              <a:t>, </a:t>
             </a:r>
             <a:r>
               <a:rPr lang="en-US" dirty="0" err="1" smtClean="0"/>
@@ -5639,52 +5571,10 @@
             </a:r>
             <a:r>
               <a:rPr lang="en-US" i="1" dirty="0" smtClean="0"/>
-              <a:t>Rainbow Tables</a:t>
-            </a:r>
-          </a:p>
-          <a:p>
-            <a:r>
-              <a:rPr lang="en-US" dirty="0" smtClean="0"/>
-              <a:t>Further issue: two users with same passwords will have same hash Y</a:t>
-            </a:r>
-          </a:p>
-          <a:p>
-            <a:r>
-              <a:rPr lang="en-US" dirty="0" smtClean="0"/>
-              <a:t>Solution: add a random </a:t>
-            </a:r>
-            <a:r>
-              <a:rPr lang="en-US" i="1" dirty="0" smtClean="0"/>
-              <a:t>salt</a:t>
-            </a:r>
-            <a:r>
-              <a:rPr lang="en-US" dirty="0"/>
-              <a:t> </a:t>
-            </a:r>
-            <a:r>
-              <a:rPr lang="en-US" dirty="0" smtClean="0"/>
-              <a:t>S (</a:t>
-            </a:r>
-            <a:r>
-              <a:rPr lang="en-US" dirty="0" err="1" smtClean="0"/>
-              <a:t>eg</a:t>
-            </a:r>
-            <a:r>
-              <a:rPr lang="en-US" dirty="0" smtClean="0"/>
-              <a:t> a random long string) to the password before hashing, and store the salt together with the hash in the database</a:t>
-            </a:r>
-          </a:p>
-          <a:p>
-            <a:r>
-              <a:rPr lang="en-US" i="1" dirty="0" smtClean="0"/>
-              <a:t>h(X+S)=Y</a:t>
-            </a:r>
-          </a:p>
-          <a:p>
-            <a:r>
-              <a:rPr lang="en-US" dirty="0" smtClean="0"/>
-              <a:t>Each user will have its own random salt</a:t>
-            </a:r>
+              <a:t>Y == h(X)</a:t>
+            </a:r>
+          </a:p>
+          <a:p>
             <a:endParaRPr lang="en-US" dirty="0"/>
           </a:p>
         </p:txBody>
@@ -5692,7 +5582,7 @@
     </p:spTree>
     <p:extLst>
       <p:ext uri="{BB962C8B-B14F-4D97-AF65-F5344CB8AC3E}">
-        <p14:creationId xmlns:p14="http://schemas.microsoft.com/office/powerpoint/2010/main" val="1454275460"/>
+        <p14:creationId xmlns:p14="http://schemas.microsoft.com/office/powerpoint/2010/main" val="42993303"/>
       </p:ext>
     </p:extLst>
   </p:cSld>
@@ -5735,8 +5625,12 @@
           <a:lstStyle/>
           <a:p>
             <a:r>
-              <a:rPr lang="en-US" dirty="0" smtClean="0"/>
-              <a:t>Pepper</a:t>
+              <a:rPr lang="en-US" i="1" dirty="0" smtClean="0"/>
+              <a:t>Salted</a:t>
+            </a:r>
+            <a:r>
+              <a:rPr lang="en-US" dirty="0" smtClean="0"/>
+              <a:t> Passwords</a:t>
             </a:r>
             <a:endParaRPr lang="en-US" dirty="0"/>
           </a:p>
@@ -5754,73 +5648,107 @@
         </p:nvSpPr>
         <p:spPr>
           <a:xfrm>
-            <a:off x="173255" y="1825624"/>
-            <a:ext cx="11800572" cy="4902435"/>
+            <a:off x="308008" y="1825624"/>
+            <a:ext cx="11704320" cy="4883184"/>
           </a:xfrm>
         </p:spPr>
         <p:txBody>
           <a:bodyPr>
-            <a:normAutofit fontScale="92500"/>
+            <a:normAutofit fontScale="85000" lnSpcReduction="20000"/>
           </a:bodyPr>
           <a:lstStyle/>
           <a:p>
             <a:r>
               <a:rPr lang="en-US" dirty="0" smtClean="0"/>
-              <a:t>If hacker has access to the database, s/he can read the </a:t>
+              <a:t>Cannot expect users to have long passwords</a:t>
+            </a:r>
+          </a:p>
+          <a:p>
+            <a:r>
+              <a:rPr lang="en-US" dirty="0" smtClean="0"/>
+              <a:t>If hacker has access to DB, from a hash </a:t>
+            </a:r>
+            <a:r>
+              <a:rPr lang="en-US" i="1" dirty="0" smtClean="0"/>
+              <a:t>Y</a:t>
+            </a:r>
+            <a:r>
+              <a:rPr lang="en-US" dirty="0" smtClean="0"/>
+              <a:t>, can calculate </a:t>
+            </a:r>
+            <a:r>
+              <a:rPr lang="en-US" i="1" dirty="0" smtClean="0"/>
+              <a:t>h(K)</a:t>
+            </a:r>
+            <a:r>
+              <a:rPr lang="en-US" dirty="0" smtClean="0"/>
+              <a:t> for all strings K up to certain length N, </a:t>
+            </a:r>
+            <a:r>
+              <a:rPr lang="en-US" dirty="0" err="1" smtClean="0"/>
+              <a:t>eg</a:t>
+            </a:r>
+            <a:r>
+              <a:rPr lang="en-US" dirty="0" smtClean="0"/>
+              <a:t> N=8, and check if any </a:t>
+            </a:r>
+            <a:r>
+              <a:rPr lang="en-US" i="1" dirty="0" smtClean="0"/>
+              <a:t>h(K)</a:t>
+            </a:r>
+            <a:r>
+              <a:rPr lang="en-US" dirty="0" smtClean="0"/>
+              <a:t> does match Y</a:t>
+            </a:r>
+          </a:p>
+          <a:p>
+            <a:r>
+              <a:rPr lang="en-US" dirty="0" smtClean="0"/>
+              <a:t>For small N, this is doable. Do not even need to run </a:t>
+            </a:r>
+            <a:r>
+              <a:rPr lang="en-US" i="1" dirty="0" smtClean="0"/>
+              <a:t>h(), </a:t>
+            </a:r>
+            <a:r>
+              <a:rPr lang="en-US" dirty="0" smtClean="0"/>
+              <a:t>as those values can be pre-computed, </a:t>
+            </a:r>
+            <a:r>
+              <a:rPr lang="en-US" dirty="0" err="1" smtClean="0"/>
+              <a:t>ie</a:t>
+            </a:r>
+            <a:r>
+              <a:rPr lang="en-US" dirty="0" smtClean="0"/>
+              <a:t> </a:t>
+            </a:r>
+            <a:r>
+              <a:rPr lang="en-US" i="1" dirty="0" smtClean="0"/>
+              <a:t>Rainbow Tables</a:t>
+            </a:r>
+          </a:p>
+          <a:p>
+            <a:r>
+              <a:rPr lang="en-US" dirty="0" smtClean="0"/>
+              <a:t>Further issue: two users with same passwords will have same hash Y</a:t>
+            </a:r>
+          </a:p>
+          <a:p>
+            <a:r>
+              <a:rPr lang="en-US" dirty="0" smtClean="0"/>
+              <a:t>Solution: add a random </a:t>
             </a:r>
             <a:r>
               <a:rPr lang="en-US" i="1" dirty="0" smtClean="0"/>
               <a:t>salt</a:t>
             </a:r>
             <a:r>
-              <a:rPr lang="en-US" dirty="0" smtClean="0"/>
-              <a:t> values  </a:t>
-            </a:r>
-          </a:p>
-          <a:p>
-            <a:r>
-              <a:rPr lang="en-US" dirty="0" smtClean="0"/>
-              <a:t>Still non-trivial to break the hash code, but doable</a:t>
-            </a:r>
-          </a:p>
-          <a:p>
-            <a:r>
-              <a:rPr lang="en-US" i="1" dirty="0" smtClean="0"/>
-              <a:t>Pepper</a:t>
-            </a:r>
-            <a:r>
-              <a:rPr lang="en-US" dirty="0" smtClean="0"/>
-              <a:t>: yet another random string added before calculating the hash</a:t>
-            </a:r>
-          </a:p>
-          <a:p>
-            <a:r>
-              <a:rPr lang="en-US" dirty="0" smtClean="0"/>
-              <a:t>NOT stored in the database, just somewhere else</a:t>
-            </a:r>
-          </a:p>
-          <a:p>
-            <a:pPr lvl="1"/>
-            <a:r>
-              <a:rPr lang="en-US" dirty="0" smtClean="0"/>
-              <a:t>  files, remote server, hardcoded in the source code, </a:t>
-            </a:r>
-            <a:r>
-              <a:rPr lang="en-US" dirty="0" err="1" smtClean="0"/>
-              <a:t>etc</a:t>
-            </a:r>
-            <a:endParaRPr lang="en-US" dirty="0" smtClean="0"/>
-          </a:p>
-          <a:p>
-            <a:r>
-              <a:rPr lang="en-US" dirty="0" smtClean="0"/>
-              <a:t>One single pepper string for whole application (and not per user)</a:t>
-            </a:r>
-          </a:p>
-          <a:p>
-            <a:r>
-              <a:rPr lang="en-US" dirty="0" smtClean="0"/>
-              <a:t>Help mitigating if hacker gets access to the database (</a:t>
+              <a:rPr lang="en-US" dirty="0"/>
+              <a:t> </a:t>
+            </a:r>
+            <a:r>
+              <a:rPr lang="en-US" dirty="0" smtClean="0"/>
+              <a:t>S (</a:t>
             </a:r>
             <a:r>
               <a:rPr lang="en-US" dirty="0" err="1" smtClean="0"/>
@@ -5828,7 +5756,19 @@
             </a:r>
             <a:r>
               <a:rPr lang="en-US" dirty="0" smtClean="0"/>
-              <a:t> via SQL Injection), as would not be able to read the pepper</a:t>
+              <a:t> a random long string) to the password before hashing, and store the salt together with the hash in the database</a:t>
+            </a:r>
+          </a:p>
+          <a:p>
+            <a:r>
+              <a:rPr lang="en-US" i="1" dirty="0" smtClean="0"/>
+              <a:t>h(X+S)=Y</a:t>
+            </a:r>
+          </a:p>
+          <a:p>
+            <a:r>
+              <a:rPr lang="en-US" dirty="0" smtClean="0"/>
+              <a:t>Each user will have its own random salt</a:t>
             </a:r>
             <a:endParaRPr lang="en-US" dirty="0"/>
           </a:p>
@@ -5837,7 +5777,7 @@
     </p:spTree>
     <p:extLst>
       <p:ext uri="{BB962C8B-B14F-4D97-AF65-F5344CB8AC3E}">
-        <p14:creationId xmlns:p14="http://schemas.microsoft.com/office/powerpoint/2010/main" val="1020950200"/>
+        <p14:creationId xmlns:p14="http://schemas.microsoft.com/office/powerpoint/2010/main" val="1454275460"/>
       </p:ext>
     </p:extLst>
   </p:cSld>
@@ -5881,7 +5821,7 @@
           <a:p>
             <a:r>
               <a:rPr lang="en-US" dirty="0" smtClean="0"/>
-              <a:t>Hash Function Speed</a:t>
+              <a:t>Pepper</a:t>
             </a:r>
             <a:endParaRPr lang="en-US" dirty="0"/>
           </a:p>
@@ -5899,60 +5839,73 @@
         </p:nvSpPr>
         <p:spPr>
           <a:xfrm>
-            <a:off x="211755" y="1825624"/>
-            <a:ext cx="11819823" cy="4912059"/>
+            <a:off x="173255" y="1825624"/>
+            <a:ext cx="11800572" cy="4902435"/>
           </a:xfrm>
         </p:spPr>
         <p:txBody>
-          <a:bodyPr/>
-          <a:lstStyle/>
-          <a:p>
-            <a:r>
-              <a:rPr lang="en-US" dirty="0" smtClean="0"/>
-              <a:t>You want hash functions that are </a:t>
+          <a:bodyPr>
+            <a:normAutofit fontScale="92500"/>
+          </a:bodyPr>
+          <a:lstStyle/>
+          <a:p>
+            <a:r>
+              <a:rPr lang="en-US" dirty="0" smtClean="0"/>
+              <a:t>If hacker has access to the database, s/he can read the </a:t>
             </a:r>
             <a:r>
               <a:rPr lang="en-US" i="1" dirty="0" smtClean="0"/>
-              <a:t>slow, </a:t>
-            </a:r>
-            <a:r>
-              <a:rPr lang="en-US" dirty="0" smtClean="0"/>
-              <a:t>to make it difficult for the hackers to break them </a:t>
+              <a:t>salt</a:t>
+            </a:r>
+            <a:r>
+              <a:rPr lang="en-US" dirty="0" smtClean="0"/>
+              <a:t> values  </a:t>
+            </a:r>
+          </a:p>
+          <a:p>
+            <a:r>
+              <a:rPr lang="en-US" dirty="0" smtClean="0"/>
+              <a:t>Still non-trivial to break the hash code, but doable</a:t>
+            </a:r>
+          </a:p>
+          <a:p>
+            <a:r>
+              <a:rPr lang="en-US" i="1" dirty="0" smtClean="0"/>
+              <a:t>Pepper</a:t>
+            </a:r>
+            <a:r>
+              <a:rPr lang="en-US" dirty="0" smtClean="0"/>
+              <a:t>: yet another random string added before calculating the hash</a:t>
+            </a:r>
+          </a:p>
+          <a:p>
+            <a:r>
+              <a:rPr lang="en-US" dirty="0" smtClean="0"/>
+              <a:t>NOT stored in the database, just somewhere else</a:t>
             </a:r>
           </a:p>
           <a:p>
             <a:pPr lvl="1"/>
             <a:r>
               <a:rPr lang="en-US" dirty="0" smtClean="0"/>
-              <a:t>but still manageable time on server to do authentication</a:t>
-            </a:r>
-          </a:p>
-          <a:p>
-            <a:r>
-              <a:rPr lang="en-US" i="1" dirty="0" err="1" smtClean="0"/>
-              <a:t>BCrypt</a:t>
-            </a:r>
-            <a:r>
-              <a:rPr lang="en-US" i="1" dirty="0" smtClean="0"/>
-              <a:t> </a:t>
-            </a:r>
-            <a:r>
-              <a:rPr lang="en-US" dirty="0" smtClean="0"/>
-              <a:t>is the most used hash function for passwords</a:t>
-            </a:r>
-          </a:p>
-          <a:p>
-            <a:r>
-              <a:rPr lang="en-US" dirty="0" smtClean="0"/>
-              <a:t>However, you can make </a:t>
-            </a:r>
-            <a:r>
-              <a:rPr lang="en-US" i="1" dirty="0" smtClean="0"/>
-              <a:t>slow</a:t>
-            </a:r>
-            <a:r>
-              <a:rPr lang="en-US" dirty="0" smtClean="0"/>
-              <a:t> any hash function (</a:t>
+              <a:t>  files, remote server, hardcoded in the source code, </a:t>
+            </a:r>
+            <a:r>
+              <a:rPr lang="en-US" dirty="0" err="1" smtClean="0"/>
+              <a:t>etc</a:t>
+            </a:r>
+            <a:endParaRPr lang="en-US" dirty="0" smtClean="0"/>
+          </a:p>
+          <a:p>
+            <a:r>
+              <a:rPr lang="en-US" dirty="0" smtClean="0"/>
+              <a:t>One single pepper string for whole application (and not per user)</a:t>
+            </a:r>
+          </a:p>
+          <a:p>
+            <a:r>
+              <a:rPr lang="en-US" dirty="0" smtClean="0"/>
+              <a:t>Help mitigating if hacker gets access to the database (</a:t>
             </a:r>
             <a:r>
               <a:rPr lang="en-US" dirty="0" err="1" smtClean="0"/>
@@ -5960,34 +5913,8 @@
             </a:r>
             <a:r>
               <a:rPr lang="en-US" dirty="0" smtClean="0"/>
-              <a:t> SHA256) by using a loop, in which  the output is re-hashed N times</a:t>
-            </a:r>
-          </a:p>
-          <a:p>
-            <a:pPr lvl="1"/>
-            <a:r>
-              <a:rPr lang="en-US" i="1" dirty="0" err="1"/>
-              <a:t>e</a:t>
-            </a:r>
-            <a:r>
-              <a:rPr lang="en-US" i="1" dirty="0" err="1" smtClean="0"/>
-              <a:t>g</a:t>
-            </a:r>
-            <a:r>
-              <a:rPr lang="en-US" i="1" dirty="0" smtClean="0"/>
-              <a:t>, N=6 h(h(h(h(h(h(x)))))) </a:t>
-            </a:r>
-            <a:r>
-              <a:rPr lang="en-US" i="1" dirty="0"/>
-              <a:t>= y</a:t>
-            </a:r>
-          </a:p>
-          <a:p>
-            <a:pPr lvl="1"/>
-            <a:endParaRPr lang="en-US" dirty="0" smtClean="0"/>
-          </a:p>
-          <a:p>
-            <a:pPr lvl="1"/>
+              <a:t> via SQL Injection), as would not be able to read the pepper</a:t>
+            </a:r>
             <a:endParaRPr lang="en-US" dirty="0"/>
           </a:p>
         </p:txBody>
@@ -5995,7 +5922,7 @@
     </p:spTree>
     <p:extLst>
       <p:ext uri="{BB962C8B-B14F-4D97-AF65-F5344CB8AC3E}">
-        <p14:creationId xmlns:p14="http://schemas.microsoft.com/office/powerpoint/2010/main" val="3281658189"/>
+        <p14:creationId xmlns:p14="http://schemas.microsoft.com/office/powerpoint/2010/main" val="1020950200"/>
       </p:ext>
     </p:extLst>
   </p:cSld>
@@ -6024,7 +5951,7 @@
       </p:grpSpPr>
       <p:sp>
         <p:nvSpPr>
-          <p:cNvPr id="4" name="Title 3"/>
+          <p:cNvPr id="2" name="Title 1"/>
           <p:cNvSpPr>
             <a:spLocks noGrp="1"/>
           </p:cNvSpPr>
@@ -6039,7 +5966,7 @@
           <a:p>
             <a:r>
               <a:rPr lang="en-US" dirty="0" smtClean="0"/>
-              <a:t>Spring Security</a:t>
+              <a:t>Hash Function Speed</a:t>
             </a:r>
             <a:endParaRPr lang="en-US" dirty="0"/>
           </a:p>
@@ -6047,27 +5974,121 @@
       </p:sp>
       <p:sp>
         <p:nvSpPr>
-          <p:cNvPr id="5" name="Text Placeholder 4"/>
-          <p:cNvSpPr>
-            <a:spLocks noGrp="1"/>
-          </p:cNvSpPr>
-          <p:nvPr>
-            <p:ph type="body" idx="1"/>
-          </p:nvPr>
-        </p:nvSpPr>
-        <p:spPr/>
+          <p:cNvPr id="3" name="Content Placeholder 2"/>
+          <p:cNvSpPr>
+            <a:spLocks noGrp="1"/>
+          </p:cNvSpPr>
+          <p:nvPr>
+            <p:ph idx="1"/>
+          </p:nvPr>
+        </p:nvSpPr>
+        <p:spPr>
+          <a:xfrm>
+            <a:off x="211755" y="1825624"/>
+            <a:ext cx="11819823" cy="4912059"/>
+          </a:xfrm>
+        </p:spPr>
         <p:txBody>
           <a:bodyPr/>
           <a:lstStyle/>
           <a:p>
-            <a:endParaRPr lang="en-US"/>
+            <a:r>
+              <a:rPr lang="en-US" dirty="0" smtClean="0"/>
+              <a:t>You want hash functions that are </a:t>
+            </a:r>
+            <a:r>
+              <a:rPr lang="en-US" i="1" dirty="0" smtClean="0"/>
+              <a:t>slow, </a:t>
+            </a:r>
+            <a:r>
+              <a:rPr lang="en-US" dirty="0" smtClean="0"/>
+              <a:t>to make it difficult for the hackers to break them </a:t>
+            </a:r>
+          </a:p>
+          <a:p>
+            <a:pPr lvl="1"/>
+            <a:r>
+              <a:rPr lang="en-US" dirty="0" smtClean="0"/>
+              <a:t>but still manageable time on server to do authentication</a:t>
+            </a:r>
+          </a:p>
+          <a:p>
+            <a:r>
+              <a:rPr lang="en-US" i="1" dirty="0" err="1" smtClean="0"/>
+              <a:t>BCrypt</a:t>
+            </a:r>
+            <a:r>
+              <a:rPr lang="en-US" i="1" dirty="0" smtClean="0"/>
+              <a:t> </a:t>
+            </a:r>
+            <a:r>
+              <a:rPr lang="en-US" dirty="0" smtClean="0"/>
+              <a:t>is the most used hash function for passwords</a:t>
+            </a:r>
+          </a:p>
+          <a:p>
+            <a:r>
+              <a:rPr lang="en-US" dirty="0" smtClean="0"/>
+              <a:t>However, you can make </a:t>
+            </a:r>
+            <a:r>
+              <a:rPr lang="en-US" i="1" dirty="0" smtClean="0"/>
+              <a:t>slow</a:t>
+            </a:r>
+            <a:r>
+              <a:rPr lang="en-US" dirty="0" smtClean="0"/>
+              <a:t> any hash function (</a:t>
+            </a:r>
+            <a:r>
+              <a:rPr lang="en-US" dirty="0" err="1" smtClean="0"/>
+              <a:t>eg</a:t>
+            </a:r>
+            <a:r>
+              <a:rPr lang="en-US" dirty="0" smtClean="0"/>
+              <a:t> SHA256) by using a loop, in which  the output is re-hashed N times</a:t>
+            </a:r>
+          </a:p>
+          <a:p>
+            <a:pPr lvl="1"/>
+            <a:r>
+              <a:rPr lang="en-US" i="1" dirty="0" err="1"/>
+              <a:t>e</a:t>
+            </a:r>
+            <a:r>
+              <a:rPr lang="en-US" i="1" dirty="0" err="1" smtClean="0"/>
+              <a:t>g</a:t>
+            </a:r>
+            <a:r>
+              <a:rPr lang="en-US" i="1" dirty="0" smtClean="0"/>
+              <a:t>, N=6 </a:t>
+            </a:r>
+            <a:r>
+              <a:rPr lang="en-US" i="1" dirty="0" smtClean="0"/>
+              <a:t> -&gt;   h(h(h(h(h(h(x</a:t>
+            </a:r>
+            <a:r>
+              <a:rPr lang="en-US" i="1" dirty="0" smtClean="0"/>
+              <a:t>)))))) </a:t>
+            </a:r>
+            <a:r>
+              <a:rPr lang="en-US" i="1" dirty="0"/>
+              <a:t>= y</a:t>
+            </a:r>
+          </a:p>
+          <a:p>
+            <a:pPr lvl="1"/>
+            <a:endParaRPr lang="en-US" dirty="0" smtClean="0"/>
+          </a:p>
+          <a:p>
+            <a:pPr lvl="1"/>
+            <a:endParaRPr lang="en-US" dirty="0"/>
           </a:p>
         </p:txBody>
       </p:sp>
     </p:spTree>
     <p:extLst>
       <p:ext uri="{BB962C8B-B14F-4D97-AF65-F5344CB8AC3E}">
-        <p14:creationId xmlns:p14="http://schemas.microsoft.com/office/powerpoint/2010/main" val="953139178"/>
+        <p14:creationId xmlns:p14="http://schemas.microsoft.com/office/powerpoint/2010/main" val="3281658189"/>
       </p:ext>
     </p:extLst>
   </p:cSld>
@@ -6096,7 +6117,7 @@
       </p:grpSpPr>
       <p:sp>
         <p:nvSpPr>
-          <p:cNvPr id="2" name="Title 1"/>
+          <p:cNvPr id="4" name="Title 3"/>
           <p:cNvSpPr>
             <a:spLocks noGrp="1"/>
           </p:cNvSpPr>
@@ -6111,53 +6132,7 @@
           <a:p>
             <a:r>
               <a:rPr lang="en-US" dirty="0" smtClean="0"/>
-              <a:t>About these slides</a:t>
-            </a:r>
-            <a:endParaRPr lang="en-US" dirty="0"/>
-          </a:p>
-        </p:txBody>
-      </p:sp>
-      <p:sp>
-        <p:nvSpPr>
-          <p:cNvPr id="3" name="Content Placeholder 2"/>
-          <p:cNvSpPr>
-            <a:spLocks noGrp="1"/>
-          </p:cNvSpPr>
-          <p:nvPr>
-            <p:ph idx="1"/>
-          </p:nvPr>
-        </p:nvSpPr>
-        <p:spPr>
-          <a:xfrm>
-            <a:off x="211756" y="1825625"/>
-            <a:ext cx="11142044" cy="4351338"/>
-          </a:xfrm>
-        </p:spPr>
-        <p:txBody>
-          <a:bodyPr/>
-          <a:lstStyle/>
-          <a:p>
-            <a:r>
-              <a:rPr lang="en-US" dirty="0" smtClean="0"/>
-              <a:t>These few slides on Spring Security are just high level overviews of what covered in class</a:t>
-            </a:r>
-          </a:p>
-          <a:p>
-            <a:r>
-              <a:rPr lang="en-US" dirty="0"/>
-              <a:t>T</a:t>
-            </a:r>
-            <a:r>
-              <a:rPr lang="en-US" dirty="0" smtClean="0"/>
-              <a:t>he details are directly in the code comments on the </a:t>
-            </a:r>
-            <a:r>
-              <a:rPr lang="en-US" dirty="0" err="1" smtClean="0"/>
-              <a:t>Git</a:t>
-            </a:r>
-            <a:r>
-              <a:rPr lang="en-US" dirty="0" smtClean="0"/>
-              <a:t> repository</a:t>
+              <a:t>Spring Security</a:t>
             </a:r>
             <a:endParaRPr lang="en-US" dirty="0"/>
           </a:p>
@@ -6166,7 +6141,7 @@
     </p:spTree>
     <p:extLst>
       <p:ext uri="{BB962C8B-B14F-4D97-AF65-F5344CB8AC3E}">
-        <p14:creationId xmlns:p14="http://schemas.microsoft.com/office/powerpoint/2010/main" val="1394936578"/>
+        <p14:creationId xmlns:p14="http://schemas.microsoft.com/office/powerpoint/2010/main" val="953139178"/>
       </p:ext>
     </p:extLst>
   </p:cSld>
@@ -6210,7 +6185,7 @@
           <a:p>
             <a:r>
               <a:rPr lang="en-US" dirty="0" smtClean="0"/>
-              <a:t>Security Is Hard</a:t>
+              <a:t>About these slides</a:t>
             </a:r>
             <a:endParaRPr lang="en-US" dirty="0"/>
           </a:p>
@@ -6228,8 +6203,8 @@
         </p:nvSpPr>
         <p:spPr>
           <a:xfrm>
-            <a:off x="144378" y="1825624"/>
-            <a:ext cx="11925701" cy="4912060"/>
+            <a:off x="211756" y="1825625"/>
+            <a:ext cx="11142044" cy="4351338"/>
           </a:xfrm>
         </p:spPr>
         <p:txBody>
@@ -6238,48 +6213,26 @@
           <a:p>
             <a:r>
               <a:rPr lang="en-US" dirty="0" smtClean="0"/>
-              <a:t>You should NOT roll out your own solutions for security</a:t>
-            </a:r>
-          </a:p>
-          <a:p>
-            <a:pPr lvl="1"/>
+              <a:t>These few slides on Spring Security are just high level overviews of what covered in class</a:t>
+            </a:r>
+          </a:p>
+          <a:p>
             <a:r>
               <a:rPr lang="en-US" dirty="0"/>
-              <a:t>f</a:t>
-            </a:r>
-            <a:r>
-              <a:rPr lang="en-US" dirty="0" smtClean="0"/>
-              <a:t>ar too easy to make mistakes</a:t>
-            </a:r>
-          </a:p>
-          <a:p>
-            <a:r>
-              <a:rPr lang="en-US" dirty="0" smtClean="0"/>
-              <a:t>Need to use existing, battle-tested frameworks</a:t>
-            </a:r>
-          </a:p>
-          <a:p>
-            <a:r>
-              <a:rPr lang="en-US" i="1" dirty="0" smtClean="0"/>
-              <a:t>Spring Security</a:t>
-            </a:r>
-            <a:r>
-              <a:rPr lang="en-US" dirty="0" smtClean="0"/>
-              <a:t>: the module of Spring that deals with security</a:t>
-            </a:r>
-          </a:p>
-          <a:p>
-            <a:r>
-              <a:rPr lang="en-US" dirty="0"/>
-              <a:t>However, still important to </a:t>
-            </a:r>
-            <a:r>
-              <a:rPr lang="en-US" dirty="0" smtClean="0"/>
-              <a:t>understand how they work internally</a:t>
-            </a:r>
-            <a:endParaRPr lang="en-US" dirty="0"/>
-          </a:p>
-          <a:p>
+              <a:t>T</a:t>
+            </a:r>
+            <a:r>
+              <a:rPr lang="en-US" dirty="0" smtClean="0"/>
+              <a:t>he details are directly in the code comments on the </a:t>
+            </a:r>
+            <a:r>
+              <a:rPr lang="en-US" dirty="0" err="1" smtClean="0"/>
+              <a:t>Git</a:t>
+            </a:r>
+            <a:r>
+              <a:rPr lang="en-US" dirty="0" smtClean="0"/>
+              <a:t> repository</a:t>
+            </a:r>
             <a:endParaRPr lang="en-US" dirty="0"/>
           </a:p>
         </p:txBody>
@@ -6287,7 +6240,7 @@
     </p:spTree>
     <p:extLst>
       <p:ext uri="{BB962C8B-B14F-4D97-AF65-F5344CB8AC3E}">
-        <p14:creationId xmlns:p14="http://schemas.microsoft.com/office/powerpoint/2010/main" val="4055156698"/>
+        <p14:creationId xmlns:p14="http://schemas.microsoft.com/office/powerpoint/2010/main" val="1394936578"/>
       </p:ext>
     </p:extLst>
   </p:cSld>
@@ -6331,7 +6284,7 @@
           <a:p>
             <a:r>
               <a:rPr lang="en-US" dirty="0" smtClean="0"/>
-              <a:t>Configuration</a:t>
+              <a:t>Security Is Hard</a:t>
             </a:r>
             <a:endParaRPr lang="en-US" dirty="0"/>
           </a:p>
@@ -6349,8 +6302,8 @@
         </p:nvSpPr>
         <p:spPr>
           <a:xfrm>
-            <a:off x="192505" y="1825624"/>
-            <a:ext cx="11733196" cy="4892809"/>
+            <a:off x="144378" y="1825624"/>
+            <a:ext cx="11925701" cy="4912060"/>
           </a:xfrm>
         </p:spPr>
         <p:txBody>
@@ -6359,136 +6312,48 @@
           <a:p>
             <a:r>
               <a:rPr lang="en-US" dirty="0" smtClean="0"/>
-              <a:t>Need to have a </a:t>
-            </a:r>
+              <a:t>You should NOT roll out your own solutions for security</a:t>
+            </a:r>
+          </a:p>
+          <a:p>
+            <a:pPr lvl="1"/>
+            <a:r>
+              <a:rPr lang="en-US" dirty="0"/>
+              <a:t>f</a:t>
+            </a:r>
+            <a:r>
+              <a:rPr lang="en-US" dirty="0" smtClean="0"/>
+              <a:t>ar too easy to make mistakes</a:t>
+            </a:r>
+          </a:p>
+          <a:p>
+            <a:r>
+              <a:rPr lang="en-US" dirty="0" smtClean="0"/>
+              <a:t>Need to use existing, battle-tested frameworks</a:t>
+            </a:r>
+          </a:p>
+          <a:p>
             <a:r>
               <a:rPr lang="en-US" i="1" dirty="0" smtClean="0"/>
-              <a:t>@Configuration </a:t>
-            </a:r>
-            <a:r>
-              <a:rPr lang="en-US" dirty="0" smtClean="0"/>
-              <a:t>bean that </a:t>
-            </a:r>
+              <a:t>Spring Security</a:t>
+            </a:r>
+            <a:r>
+              <a:rPr lang="en-US" dirty="0" smtClean="0"/>
+              <a:t>: the module of Spring that deals with security</a:t>
+            </a:r>
+          </a:p>
+          <a:p>
             <a:r>
               <a:rPr lang="en-US" dirty="0"/>
-              <a:t>extends </a:t>
-            </a:r>
-            <a:r>
-              <a:rPr lang="en-US" i="1" dirty="0" err="1" smtClean="0"/>
-              <a:t>WebSecurityConfigurerAdapter</a:t>
-            </a:r>
-            <a:endParaRPr lang="en-US" i="1" dirty="0" smtClean="0"/>
-          </a:p>
-          <a:p>
-            <a:r>
-              <a:rPr lang="en-US" dirty="0" smtClean="0"/>
-              <a:t>Furthermore, need to use the </a:t>
-            </a:r>
-            <a:r>
-              <a:rPr lang="en-US" dirty="0"/>
-              <a:t>annotation </a:t>
-            </a:r>
-            <a:r>
-              <a:rPr lang="en-US" i="1" dirty="0"/>
-              <a:t>@</a:t>
-            </a:r>
-            <a:r>
-              <a:rPr lang="en-US" i="1" dirty="0" err="1" smtClean="0"/>
-              <a:t>EnableWebSecurity</a:t>
-            </a:r>
-            <a:endParaRPr lang="en-US" i="1" dirty="0" smtClean="0"/>
-          </a:p>
-          <a:p>
-            <a:r>
-              <a:rPr lang="en-US" dirty="0" smtClean="0"/>
-              <a:t>Then, in such class you can override the methods:</a:t>
-            </a:r>
-          </a:p>
-          <a:p>
-            <a:pPr lvl="1"/>
-            <a:r>
-              <a:rPr lang="en-US" i="1" dirty="0"/>
-              <a:t>configure(</a:t>
-            </a:r>
-            <a:r>
-              <a:rPr lang="en-US" i="1" dirty="0" err="1"/>
-              <a:t>AuthenticationManagerBuilder</a:t>
-            </a:r>
-            <a:r>
-              <a:rPr lang="en-US" i="1" dirty="0"/>
-              <a:t> </a:t>
-            </a:r>
-            <a:r>
-              <a:rPr lang="en-US" i="1" dirty="0" err="1"/>
-              <a:t>auth</a:t>
-            </a:r>
-            <a:r>
-              <a:rPr lang="en-US" i="1" dirty="0" smtClean="0"/>
-              <a:t>) </a:t>
-            </a:r>
-            <a:r>
-              <a:rPr lang="en-US" dirty="0" smtClean="0"/>
-              <a:t>for handling </a:t>
-            </a:r>
-            <a:r>
-              <a:rPr lang="en-US" i="1" dirty="0" smtClean="0"/>
-              <a:t>authentication</a:t>
-            </a:r>
-            <a:r>
-              <a:rPr lang="en-US" dirty="0" smtClean="0"/>
-              <a:t>, </a:t>
-            </a:r>
-            <a:r>
-              <a:rPr lang="en-US" dirty="0" err="1" smtClean="0"/>
-              <a:t>ie</a:t>
-            </a:r>
-            <a:r>
-              <a:rPr lang="en-US" dirty="0" smtClean="0"/>
-              <a:t> checking of users on database and password storage</a:t>
-            </a:r>
-          </a:p>
-          <a:p>
-            <a:pPr lvl="1"/>
-            <a:r>
-              <a:rPr lang="en-US" i="1" dirty="0" smtClean="0"/>
-              <a:t>configure(</a:t>
-            </a:r>
-            <a:r>
-              <a:rPr lang="en-US" i="1" dirty="0" err="1" smtClean="0"/>
-              <a:t>HttpSecurity</a:t>
-            </a:r>
-            <a:r>
-              <a:rPr lang="en-US" i="1" dirty="0" smtClean="0"/>
-              <a:t> </a:t>
-            </a:r>
-            <a:r>
-              <a:rPr lang="en-US" i="1" dirty="0"/>
-              <a:t>http</a:t>
-            </a:r>
-            <a:r>
-              <a:rPr lang="en-US" i="1" dirty="0" smtClean="0"/>
-              <a:t>) </a:t>
-            </a:r>
-            <a:r>
-              <a:rPr lang="en-US" dirty="0" smtClean="0"/>
-              <a:t>for handling </a:t>
-            </a:r>
-            <a:r>
-              <a:rPr lang="en-US" i="1" dirty="0" smtClean="0"/>
-              <a:t>authorization</a:t>
-            </a:r>
-            <a:r>
-              <a:rPr lang="en-US" dirty="0" smtClean="0"/>
-              <a:t>, </a:t>
-            </a:r>
-            <a:r>
-              <a:rPr lang="en-US" dirty="0" err="1" smtClean="0"/>
-              <a:t>ie</a:t>
-            </a:r>
-            <a:r>
-              <a:rPr lang="en-US" dirty="0" smtClean="0"/>
-              <a:t> the access policy rules </a:t>
-            </a:r>
+              <a:t>However, still important to </a:t>
+            </a:r>
+            <a:r>
+              <a:rPr lang="en-US" dirty="0" smtClean="0"/>
+              <a:t>understand how they work internally</a:t>
+            </a:r>
+            <a:endParaRPr lang="en-US" dirty="0"/>
+          </a:p>
+          <a:p>
             <a:endParaRPr lang="en-US" dirty="0"/>
           </a:p>
         </p:txBody>
@@ -6496,7 +6361,7 @@
     </p:spTree>
     <p:extLst>
       <p:ext uri="{BB962C8B-B14F-4D97-AF65-F5344CB8AC3E}">
-        <p14:creationId xmlns:p14="http://schemas.microsoft.com/office/powerpoint/2010/main" val="1097989996"/>
+        <p14:creationId xmlns:p14="http://schemas.microsoft.com/office/powerpoint/2010/main" val="4055156698"/>
       </p:ext>
     </p:extLst>
   </p:cSld>
@@ -6525,7 +6390,7 @@
       </p:grpSpPr>
       <p:sp>
         <p:nvSpPr>
-          <p:cNvPr id="4" name="Title 3"/>
+          <p:cNvPr id="2" name="Title 1"/>
           <p:cNvSpPr>
             <a:spLocks noGrp="1"/>
           </p:cNvSpPr>
@@ -6540,7 +6405,7 @@
           <a:p>
             <a:r>
               <a:rPr lang="en-US" dirty="0" smtClean="0"/>
-              <a:t>OWASP</a:t>
+              <a:t>Configuration</a:t>
             </a:r>
             <a:endParaRPr lang="en-US" dirty="0"/>
           </a:p>
@@ -6548,27 +6413,164 @@
       </p:sp>
       <p:sp>
         <p:nvSpPr>
-          <p:cNvPr id="5" name="Text Placeholder 4"/>
-          <p:cNvSpPr>
-            <a:spLocks noGrp="1"/>
-          </p:cNvSpPr>
-          <p:nvPr>
-            <p:ph type="body" idx="1"/>
-          </p:nvPr>
-        </p:nvSpPr>
-        <p:spPr/>
+          <p:cNvPr id="3" name="Content Placeholder 2"/>
+          <p:cNvSpPr>
+            <a:spLocks noGrp="1"/>
+          </p:cNvSpPr>
+          <p:nvPr>
+            <p:ph idx="1"/>
+          </p:nvPr>
+        </p:nvSpPr>
+        <p:spPr>
+          <a:xfrm>
+            <a:off x="192505" y="1825624"/>
+            <a:ext cx="11733196" cy="4892809"/>
+          </a:xfrm>
+        </p:spPr>
         <p:txBody>
           <a:bodyPr/>
           <a:lstStyle/>
           <a:p>
-            <a:endParaRPr lang="en-US"/>
+            <a:r>
+              <a:rPr lang="en-US" dirty="0" smtClean="0"/>
+              <a:t>Need to have a </a:t>
+            </a:r>
+            <a:r>
+              <a:rPr lang="en-US" i="1" dirty="0" smtClean="0"/>
+              <a:t>@Configuration </a:t>
+            </a:r>
+            <a:r>
+              <a:rPr lang="en-US" dirty="0" smtClean="0"/>
+              <a:t>bean that </a:t>
+            </a:r>
+            <a:r>
+              <a:rPr lang="en-US" dirty="0"/>
+              <a:t>extends </a:t>
+            </a:r>
+            <a:r>
+              <a:rPr lang="en-US" i="1" dirty="0" err="1" smtClean="0"/>
+              <a:t>WebSecurityConfigurerAdapter</a:t>
+            </a:r>
+            <a:endParaRPr lang="en-US" i="1" dirty="0" smtClean="0"/>
+          </a:p>
+          <a:p>
+            <a:r>
+              <a:rPr lang="en-US" dirty="0" smtClean="0"/>
+              <a:t>Furthermore, need to use the </a:t>
+            </a:r>
+            <a:r>
+              <a:rPr lang="en-US" dirty="0"/>
+              <a:t>annotation </a:t>
+            </a:r>
+            <a:r>
+              <a:rPr lang="en-US" i="1" dirty="0"/>
+              <a:t>@</a:t>
+            </a:r>
+            <a:r>
+              <a:rPr lang="en-US" i="1" dirty="0" err="1" smtClean="0"/>
+              <a:t>EnableWebSecurity</a:t>
+            </a:r>
+            <a:endParaRPr lang="en-US" i="1" dirty="0" smtClean="0"/>
+          </a:p>
+          <a:p>
+            <a:r>
+              <a:rPr lang="en-US" dirty="0" smtClean="0"/>
+              <a:t>Then, in such class you can override the methods:</a:t>
+            </a:r>
+          </a:p>
+          <a:p>
+            <a:pPr lvl="1"/>
+            <a:r>
+              <a:rPr lang="en-US" i="1" dirty="0"/>
+              <a:t>configure(</a:t>
+            </a:r>
+            <a:r>
+              <a:rPr lang="en-US" i="1" dirty="0" err="1"/>
+              <a:t>AuthenticationManagerBuilder</a:t>
+            </a:r>
+            <a:r>
+              <a:rPr lang="en-US" i="1" dirty="0"/>
+              <a:t> </a:t>
+            </a:r>
+            <a:r>
+              <a:rPr lang="en-US" i="1" dirty="0" err="1"/>
+              <a:t>auth</a:t>
+            </a:r>
+            <a:r>
+              <a:rPr lang="en-US" i="1" dirty="0" smtClean="0"/>
+              <a:t>) </a:t>
+            </a:r>
+            <a:r>
+              <a:rPr lang="en-US" dirty="0" smtClean="0"/>
+              <a:t>for handling </a:t>
+            </a:r>
+            <a:r>
+              <a:rPr lang="en-US" i="1" dirty="0" smtClean="0"/>
+              <a:t>authentication</a:t>
+            </a:r>
+            <a:r>
+              <a:rPr lang="en-US" dirty="0" smtClean="0"/>
+              <a:t>, </a:t>
+            </a:r>
+            <a:r>
+              <a:rPr lang="en-US" dirty="0" err="1" smtClean="0"/>
+              <a:t>ie</a:t>
+            </a:r>
+            <a:r>
+              <a:rPr lang="en-US" dirty="0" smtClean="0"/>
+              <a:t> checking of users on database and password storage</a:t>
+            </a:r>
+          </a:p>
+          <a:p>
+            <a:pPr lvl="1"/>
+            <a:r>
+              <a:rPr lang="en-US" i="1" dirty="0" smtClean="0"/>
+              <a:t>configure(</a:t>
+            </a:r>
+            <a:r>
+              <a:rPr lang="en-US" i="1" dirty="0" err="1" smtClean="0"/>
+              <a:t>HttpSecurity</a:t>
+            </a:r>
+            <a:r>
+              <a:rPr lang="en-US" i="1" dirty="0" smtClean="0"/>
+              <a:t> </a:t>
+            </a:r>
+            <a:r>
+              <a:rPr lang="en-US" i="1" dirty="0"/>
+              <a:t>http</a:t>
+            </a:r>
+            <a:r>
+              <a:rPr lang="en-US" i="1" dirty="0" smtClean="0"/>
+              <a:t>) </a:t>
+            </a:r>
+            <a:r>
+              <a:rPr lang="en-US" dirty="0" smtClean="0"/>
+              <a:t>for handling </a:t>
+            </a:r>
+            <a:r>
+              <a:rPr lang="en-US" i="1" dirty="0" smtClean="0"/>
+              <a:t>authorization</a:t>
+            </a:r>
+            <a:r>
+              <a:rPr lang="en-US" dirty="0" smtClean="0"/>
+              <a:t>, </a:t>
+            </a:r>
+            <a:r>
+              <a:rPr lang="en-US" dirty="0" err="1" smtClean="0"/>
+              <a:t>ie</a:t>
+            </a:r>
+            <a:r>
+              <a:rPr lang="en-US" dirty="0" smtClean="0"/>
+              <a:t> the access policy rules </a:t>
+            </a:r>
+            <a:endParaRPr lang="en-US" dirty="0"/>
           </a:p>
         </p:txBody>
       </p:sp>
     </p:spTree>
     <p:extLst>
       <p:ext uri="{BB962C8B-B14F-4D97-AF65-F5344CB8AC3E}">
-        <p14:creationId xmlns:p14="http://schemas.microsoft.com/office/powerpoint/2010/main" val="151532738"/>
+        <p14:creationId xmlns:p14="http://schemas.microsoft.com/office/powerpoint/2010/main" val="1097989996"/>
       </p:ext>
     </p:extLst>
   </p:cSld>
@@ -6597,7 +6599,7 @@
       </p:grpSpPr>
       <p:sp>
         <p:nvSpPr>
-          <p:cNvPr id="2" name="Title 1"/>
+          <p:cNvPr id="4" name="Title 3"/>
           <p:cNvSpPr>
             <a:spLocks noGrp="1"/>
           </p:cNvSpPr>
@@ -6605,110 +6607,14 @@
             <p:ph type="title"/>
           </p:nvPr>
         </p:nvSpPr>
-        <p:spPr>
-          <a:xfrm>
-            <a:off x="182880" y="365125"/>
-            <a:ext cx="11762072" cy="1325563"/>
-          </a:xfrm>
-        </p:spPr>
-        <p:txBody>
-          <a:bodyPr>
-            <a:normAutofit fontScale="90000"/>
-          </a:bodyPr>
-          <a:lstStyle/>
-          <a:p>
-            <a:r>
-              <a:rPr lang="en-US"/>
-              <a:t>Open Web Application Security Project (OWASP) </a:t>
-            </a:r>
-            <a:endParaRPr lang="en-US" dirty="0"/>
-          </a:p>
-        </p:txBody>
-      </p:sp>
-      <p:sp>
-        <p:nvSpPr>
-          <p:cNvPr id="3" name="Content Placeholder 2"/>
-          <p:cNvSpPr>
-            <a:spLocks noGrp="1"/>
-          </p:cNvSpPr>
-          <p:nvPr>
-            <p:ph idx="1"/>
-          </p:nvPr>
-        </p:nvSpPr>
-        <p:spPr>
-          <a:xfrm>
-            <a:off x="182880" y="1970003"/>
-            <a:ext cx="11762072" cy="4777305"/>
-          </a:xfrm>
-        </p:spPr>
+        <p:spPr/>
         <p:txBody>
           <a:bodyPr/>
           <a:lstStyle/>
           <a:p>
             <a:r>
-              <a:rPr lang="en-US" dirty="0" smtClean="0">
-                <a:hlinkClick r:id="rId2"/>
-              </a:rPr>
-              <a:t>www.owasp.org</a:t>
-            </a:r>
-            <a:endParaRPr lang="en-US" dirty="0" smtClean="0"/>
-          </a:p>
-          <a:p>
-            <a:r>
-              <a:rPr lang="en-US" dirty="0" smtClean="0"/>
-              <a:t>A non-profit organization dedicated to software security</a:t>
-            </a:r>
-          </a:p>
-          <a:p>
-            <a:r>
-              <a:rPr lang="en-US" dirty="0" smtClean="0"/>
-              <a:t>One of the main resources to learn about software security</a:t>
-            </a:r>
-          </a:p>
-          <a:p>
-            <a:r>
-              <a:rPr lang="en-US" dirty="0" smtClean="0"/>
-              <a:t>Also produces some open-source tools (</a:t>
-            </a:r>
-            <a:r>
-              <a:rPr lang="en-US" dirty="0" err="1" smtClean="0"/>
-              <a:t>eg</a:t>
-            </a:r>
-            <a:r>
-              <a:rPr lang="en-US" dirty="0" smtClean="0"/>
-              <a:t> </a:t>
-            </a:r>
-            <a:r>
-              <a:rPr lang="en-US" i="1" dirty="0" smtClean="0"/>
-              <a:t>ZAP</a:t>
-            </a:r>
-            <a:r>
-              <a:rPr lang="en-US" dirty="0" smtClean="0"/>
-              <a:t> for penetration testing)</a:t>
-            </a:r>
-          </a:p>
-          <a:p>
-            <a:r>
-              <a:rPr lang="en-US" dirty="0" smtClean="0"/>
-              <a:t>Maven plugin </a:t>
-            </a:r>
-            <a:r>
-              <a:rPr lang="en-US" i="1" dirty="0" smtClean="0"/>
-              <a:t>dependency-check-maven</a:t>
-            </a:r>
-          </a:p>
-          <a:p>
-            <a:pPr lvl="1"/>
-            <a:r>
-              <a:rPr lang="en-US" dirty="0" smtClean="0"/>
-              <a:t>Scan your third-party dependency libraries for known vulnerability</a:t>
-            </a:r>
-          </a:p>
-          <a:p>
-            <a:pPr lvl="1"/>
-            <a:r>
-              <a:rPr lang="en-US" dirty="0" smtClean="0"/>
-              <a:t>Automatically connect to an updated database</a:t>
+              <a:rPr lang="en-US" dirty="0" smtClean="0"/>
+              <a:t>OWASP</a:t>
             </a:r>
             <a:endParaRPr lang="en-US" dirty="0"/>
           </a:p>
@@ -6717,7 +6623,7 @@
     </p:spTree>
     <p:extLst>
       <p:ext uri="{BB962C8B-B14F-4D97-AF65-F5344CB8AC3E}">
-        <p14:creationId xmlns:p14="http://schemas.microsoft.com/office/powerpoint/2010/main" val="2042605871"/>
+        <p14:creationId xmlns:p14="http://schemas.microsoft.com/office/powerpoint/2010/main" val="151532738"/>
       </p:ext>
     </p:extLst>
   </p:cSld>
@@ -6891,6 +6797,176 @@
 </file>
 
 <file path=ppt/slides/slide30.xml><?xml version="1.0" encoding="utf-8"?>
+<p:sld xmlns:a="http://schemas.openxmlformats.org/drawingml/2006/main" xmlns:r="http://schemas.openxmlformats.org/officeDocument/2006/relationships" xmlns:p="http://schemas.openxmlformats.org/presentationml/2006/main">
+  <p:cSld>
+    <p:spTree>
+      <p:nvGrpSpPr>
+        <p:cNvPr id="1" name=""/>
+        <p:cNvGrpSpPr/>
+        <p:nvPr/>
+      </p:nvGrpSpPr>
+      <p:grpSpPr>
+        <a:xfrm>
+          <a:off x="0" y="0"/>
+          <a:ext cx="0" cy="0"/>
+          <a:chOff x="0" y="0"/>
+          <a:chExt cx="0" cy="0"/>
+        </a:xfrm>
+      </p:grpSpPr>
+      <p:sp>
+        <p:nvSpPr>
+          <p:cNvPr id="2" name="Title 1"/>
+          <p:cNvSpPr>
+            <a:spLocks noGrp="1"/>
+          </p:cNvSpPr>
+          <p:nvPr>
+            <p:ph type="title"/>
+          </p:nvPr>
+        </p:nvSpPr>
+        <p:spPr>
+          <a:xfrm>
+            <a:off x="182880" y="365125"/>
+            <a:ext cx="11762072" cy="1325563"/>
+          </a:xfrm>
+        </p:spPr>
+        <p:txBody>
+          <a:bodyPr>
+            <a:normAutofit fontScale="90000"/>
+          </a:bodyPr>
+          <a:lstStyle/>
+          <a:p>
+            <a:r>
+              <a:rPr lang="en-US"/>
+              <a:t>Open Web Application Security Project (OWASP) </a:t>
+            </a:r>
+            <a:endParaRPr lang="en-US" dirty="0"/>
+          </a:p>
+        </p:txBody>
+      </p:sp>
+      <p:sp>
+        <p:nvSpPr>
+          <p:cNvPr id="3" name="Content Placeholder 2"/>
+          <p:cNvSpPr>
+            <a:spLocks noGrp="1"/>
+          </p:cNvSpPr>
+          <p:nvPr>
+            <p:ph idx="1"/>
+          </p:nvPr>
+        </p:nvSpPr>
+        <p:spPr>
+          <a:xfrm>
+            <a:off x="86570" y="1970003"/>
+            <a:ext cx="11988239" cy="4777305"/>
+          </a:xfrm>
+        </p:spPr>
+        <p:txBody>
+          <a:bodyPr>
+            <a:normAutofit fontScale="92500"/>
+          </a:bodyPr>
+          <a:lstStyle/>
+          <a:p>
+            <a:r>
+              <a:rPr lang="en-US" dirty="0" smtClean="0">
+                <a:hlinkClick r:id="rId2"/>
+              </a:rPr>
+              <a:t>www.owasp.org</a:t>
+            </a:r>
+            <a:endParaRPr lang="en-US" dirty="0" smtClean="0"/>
+          </a:p>
+          <a:p>
+            <a:r>
+              <a:rPr lang="en-US" dirty="0" smtClean="0"/>
+              <a:t>A non-profit organization dedicated to software security</a:t>
+            </a:r>
+          </a:p>
+          <a:p>
+            <a:r>
+              <a:rPr lang="en-US" dirty="0" smtClean="0"/>
+              <a:t>One of the main resources to learn about software security</a:t>
+            </a:r>
+          </a:p>
+          <a:p>
+            <a:r>
+              <a:rPr lang="en-US" dirty="0" smtClean="0"/>
+              <a:t>Also produces some open-source tools (</a:t>
+            </a:r>
+            <a:r>
+              <a:rPr lang="en-US" dirty="0" err="1" smtClean="0"/>
+              <a:t>eg</a:t>
+            </a:r>
+            <a:r>
+              <a:rPr lang="en-US" dirty="0" smtClean="0"/>
+              <a:t> </a:t>
+            </a:r>
+            <a:r>
+              <a:rPr lang="en-US" i="1" dirty="0" smtClean="0"/>
+              <a:t>ZAP</a:t>
+            </a:r>
+            <a:r>
+              <a:rPr lang="en-US" dirty="0" smtClean="0"/>
+              <a:t> for penetration testing)</a:t>
+            </a:r>
+          </a:p>
+          <a:p>
+            <a:r>
+              <a:rPr lang="en-US" dirty="0" smtClean="0"/>
+              <a:t>Maven plugin </a:t>
+            </a:r>
+            <a:r>
+              <a:rPr lang="en-US" i="1" dirty="0" smtClean="0"/>
+              <a:t>dependency-check-maven</a:t>
+            </a:r>
+          </a:p>
+          <a:p>
+            <a:pPr lvl="1"/>
+            <a:r>
+              <a:rPr lang="en-US" dirty="0" smtClean="0"/>
+              <a:t>Scan your third-party dependency libraries for known vulnerability</a:t>
+            </a:r>
+          </a:p>
+          <a:p>
+            <a:pPr lvl="1"/>
+            <a:r>
+              <a:rPr lang="en-US" dirty="0" smtClean="0"/>
+              <a:t>Automatically connect to an updated </a:t>
+            </a:r>
+            <a:r>
+              <a:rPr lang="en-US" dirty="0" smtClean="0"/>
+              <a:t>database</a:t>
+            </a:r>
+          </a:p>
+          <a:p>
+            <a:pPr lvl="1"/>
+            <a:r>
+              <a:rPr lang="en-US" dirty="0" smtClean="0"/>
+              <a:t>Note: nowadays hosting services like </a:t>
+            </a:r>
+            <a:r>
+              <a:rPr lang="en-US" i="1" dirty="0" smtClean="0"/>
+              <a:t>GitHub</a:t>
+            </a:r>
+            <a:r>
+              <a:rPr lang="en-US" dirty="0" smtClean="0"/>
+              <a:t> do dependency checks automatically</a:t>
+            </a:r>
+            <a:endParaRPr lang="en-US" dirty="0"/>
+          </a:p>
+        </p:txBody>
+      </p:sp>
+    </p:spTree>
+    <p:extLst>
+      <p:ext uri="{BB962C8B-B14F-4D97-AF65-F5344CB8AC3E}">
+        <p14:creationId xmlns:p14="http://schemas.microsoft.com/office/powerpoint/2010/main" val="2042605871"/>
+      </p:ext>
+    </p:extLst>
+  </p:cSld>
+  <p:clrMapOvr>
+    <a:masterClrMapping/>
+  </p:clrMapOvr>
+</p:sld>
+</file>
+
+<file path=ppt/slides/slide31.xml><?xml version="1.0" encoding="utf-8"?>
 <p:sld xmlns:a="http://schemas.openxmlformats.org/drawingml/2006/main" xmlns:r="http://schemas.openxmlformats.org/officeDocument/2006/relationships" xmlns:p="http://schemas.openxmlformats.org/presentationml/2006/main">
   <p:cSld>
     <p:spTree>

</xml_diff>